<commit_message>
Tutorial 2; add baseline
</commit_message>
<xml_diff>
--- a/inst/tmp.pptx
+++ b/inst/tmp.pptx
@@ -9,6 +9,7 @@
     <p:sldId id="256" r:id="rId3"/>
     <p:sldId id="257" r:id="rId4"/>
     <p:sldId id="259" r:id="rId5"/>
+    <p:sldId id="260" r:id="rId6"/>
   </p:sldIdLst>
   <p:sldSz cx="12192000" cy="6858000"/>
   <p:notesSz cx="6858000" cy="9144000"/>
@@ -107,6 +108,11 @@
       </a:defRPr>
     </a:lvl9pPr>
   </p:defaultTextStyle>
+  <p:extLst>
+    <p:ext uri="{EFAFB233-063F-42B5-8137-9DF3F51BA10A}">
+      <p15:sldGuideLst xmlns:p15="http://schemas.microsoft.com/office/powerpoint/2012/main"/>
+    </p:ext>
+  </p:extLst>
 </p:presentation>
 </file>
 
@@ -259,7 +265,7 @@
           <a:p>
             <a:fld id="{63C097CE-CE30-40FD-8349-F85D75ED7B0A}" type="datetimeFigureOut">
               <a:rPr lang="en-US" smtClean="0"/>
-              <a:t>8/6/2018</a:t>
+              <a:t>8/7/2018</a:t>
             </a:fld>
             <a:endParaRPr lang="en-US"/>
           </a:p>
@@ -459,7 +465,7 @@
           <a:p>
             <a:fld id="{63C097CE-CE30-40FD-8349-F85D75ED7B0A}" type="datetimeFigureOut">
               <a:rPr lang="en-US" smtClean="0"/>
-              <a:t>8/6/2018</a:t>
+              <a:t>8/7/2018</a:t>
             </a:fld>
             <a:endParaRPr lang="en-US"/>
           </a:p>
@@ -669,7 +675,7 @@
           <a:p>
             <a:fld id="{63C097CE-CE30-40FD-8349-F85D75ED7B0A}" type="datetimeFigureOut">
               <a:rPr lang="en-US" smtClean="0"/>
-              <a:t>8/6/2018</a:t>
+              <a:t>8/7/2018</a:t>
             </a:fld>
             <a:endParaRPr lang="en-US"/>
           </a:p>
@@ -869,7 +875,7 @@
           <a:p>
             <a:fld id="{63C097CE-CE30-40FD-8349-F85D75ED7B0A}" type="datetimeFigureOut">
               <a:rPr lang="en-US" smtClean="0"/>
-              <a:t>8/6/2018</a:t>
+              <a:t>8/7/2018</a:t>
             </a:fld>
             <a:endParaRPr lang="en-US"/>
           </a:p>
@@ -1145,7 +1151,7 @@
           <a:p>
             <a:fld id="{63C097CE-CE30-40FD-8349-F85D75ED7B0A}" type="datetimeFigureOut">
               <a:rPr lang="en-US" smtClean="0"/>
-              <a:t>8/6/2018</a:t>
+              <a:t>8/7/2018</a:t>
             </a:fld>
             <a:endParaRPr lang="en-US"/>
           </a:p>
@@ -1413,7 +1419,7 @@
           <a:p>
             <a:fld id="{63C097CE-CE30-40FD-8349-F85D75ED7B0A}" type="datetimeFigureOut">
               <a:rPr lang="en-US" smtClean="0"/>
-              <a:t>8/6/2018</a:t>
+              <a:t>8/7/2018</a:t>
             </a:fld>
             <a:endParaRPr lang="en-US"/>
           </a:p>
@@ -1828,7 +1834,7 @@
           <a:p>
             <a:fld id="{63C097CE-CE30-40FD-8349-F85D75ED7B0A}" type="datetimeFigureOut">
               <a:rPr lang="en-US" smtClean="0"/>
-              <a:t>8/6/2018</a:t>
+              <a:t>8/7/2018</a:t>
             </a:fld>
             <a:endParaRPr lang="en-US"/>
           </a:p>
@@ -1970,7 +1976,7 @@
           <a:p>
             <a:fld id="{63C097CE-CE30-40FD-8349-F85D75ED7B0A}" type="datetimeFigureOut">
               <a:rPr lang="en-US" smtClean="0"/>
-              <a:t>8/6/2018</a:t>
+              <a:t>8/7/2018</a:t>
             </a:fld>
             <a:endParaRPr lang="en-US"/>
           </a:p>
@@ -2083,7 +2089,7 @@
           <a:p>
             <a:fld id="{63C097CE-CE30-40FD-8349-F85D75ED7B0A}" type="datetimeFigureOut">
               <a:rPr lang="en-US" smtClean="0"/>
-              <a:t>8/6/2018</a:t>
+              <a:t>8/7/2018</a:t>
             </a:fld>
             <a:endParaRPr lang="en-US"/>
           </a:p>
@@ -2396,7 +2402,7 @@
           <a:p>
             <a:fld id="{63C097CE-CE30-40FD-8349-F85D75ED7B0A}" type="datetimeFigureOut">
               <a:rPr lang="en-US" smtClean="0"/>
-              <a:t>8/6/2018</a:t>
+              <a:t>8/7/2018</a:t>
             </a:fld>
             <a:endParaRPr lang="en-US"/>
           </a:p>
@@ -2685,7 +2691,7 @@
           <a:p>
             <a:fld id="{63C097CE-CE30-40FD-8349-F85D75ED7B0A}" type="datetimeFigureOut">
               <a:rPr lang="en-US" smtClean="0"/>
-              <a:t>8/6/2018</a:t>
+              <a:t>8/7/2018</a:t>
             </a:fld>
             <a:endParaRPr lang="en-US"/>
           </a:p>
@@ -2928,7 +2934,7 @@
           <a:p>
             <a:fld id="{63C097CE-CE30-40FD-8349-F85D75ED7B0A}" type="datetimeFigureOut">
               <a:rPr lang="en-US" smtClean="0"/>
-              <a:t>8/6/2018</a:t>
+              <a:t>8/7/2018</a:t>
             </a:fld>
             <a:endParaRPr lang="en-US"/>
           </a:p>
@@ -7185,6 +7191,146 @@
 </p:sld>
 </file>
 
+<file path=ppt/slides/slide5.xml><?xml version="1.0" encoding="utf-8"?>
+<p:sld xmlns:a="http://schemas.openxmlformats.org/drawingml/2006/main" xmlns:r="http://schemas.openxmlformats.org/officeDocument/2006/relationships" xmlns:p="http://schemas.openxmlformats.org/presentationml/2006/main">
+  <p:cSld>
+    <p:spTree>
+      <p:nvGrpSpPr>
+        <p:cNvPr id="1" name=""/>
+        <p:cNvGrpSpPr/>
+        <p:nvPr/>
+      </p:nvGrpSpPr>
+      <p:grpSpPr>
+        <a:xfrm>
+          <a:off x="0" y="0"/>
+          <a:ext cx="0" cy="0"/>
+          <a:chOff x="0" y="0"/>
+          <a:chExt cx="0" cy="0"/>
+        </a:xfrm>
+      </p:grpSpPr>
+      <p:pic>
+        <p:nvPicPr>
+          <p:cNvPr id="4" name="Image 3">
+            <a:extLst>
+              <a:ext uri="{FF2B5EF4-FFF2-40B4-BE49-F238E27FC236}">
+                <a16:creationId xmlns:a16="http://schemas.microsoft.com/office/drawing/2014/main" id="{8787075B-6F97-4898-B1E5-8FFB1109BD97}"/>
+              </a:ext>
+            </a:extLst>
+          </p:cNvPr>
+          <p:cNvPicPr>
+            <a:picLocks noChangeAspect="1"/>
+          </p:cNvPicPr>
+          <p:nvPr/>
+        </p:nvPicPr>
+        <p:blipFill rotWithShape="1">
+          <a:blip r:embed="rId2"/>
+          <a:srcRect r="1078" b="1049"/>
+          <a:stretch/>
+        </p:blipFill>
+        <p:spPr>
+          <a:xfrm>
+            <a:off x="809625" y="704850"/>
+            <a:ext cx="10458739" cy="5391150"/>
+          </a:xfrm>
+          <a:prstGeom prst="rect">
+            <a:avLst/>
+          </a:prstGeom>
+        </p:spPr>
+      </p:pic>
+      <p:cxnSp>
+        <p:nvCxnSpPr>
+          <p:cNvPr id="6" name="Connecteur droit 5">
+            <a:extLst>
+              <a:ext uri="{FF2B5EF4-FFF2-40B4-BE49-F238E27FC236}">
+                <a16:creationId xmlns:a16="http://schemas.microsoft.com/office/drawing/2014/main" id="{22056666-B301-4BED-8739-946193260049}"/>
+              </a:ext>
+            </a:extLst>
+          </p:cNvPr>
+          <p:cNvCxnSpPr/>
+          <p:nvPr/>
+        </p:nvCxnSpPr>
+        <p:spPr>
+          <a:xfrm>
+            <a:off x="1597891" y="5246255"/>
+            <a:ext cx="9596582" cy="0"/>
+          </a:xfrm>
+          <a:prstGeom prst="line">
+            <a:avLst/>
+          </a:prstGeom>
+          <a:ln w="38100">
+            <a:solidFill>
+              <a:srgbClr val="FF0000"/>
+            </a:solidFill>
+            <a:prstDash val="sysDot"/>
+          </a:ln>
+        </p:spPr>
+        <p:style>
+          <a:lnRef idx="1">
+            <a:schemeClr val="accent1"/>
+          </a:lnRef>
+          <a:fillRef idx="0">
+            <a:schemeClr val="accent1"/>
+          </a:fillRef>
+          <a:effectRef idx="0">
+            <a:schemeClr val="accent1"/>
+          </a:effectRef>
+          <a:fontRef idx="minor">
+            <a:schemeClr val="tx1"/>
+          </a:fontRef>
+        </p:style>
+      </p:cxnSp>
+      <p:sp>
+        <p:nvSpPr>
+          <p:cNvPr id="7" name="ZoneTexte 6">
+            <a:extLst>
+              <a:ext uri="{FF2B5EF4-FFF2-40B4-BE49-F238E27FC236}">
+                <a16:creationId xmlns:a16="http://schemas.microsoft.com/office/drawing/2014/main" id="{5E3383E5-F4E6-4347-91FB-CB6D869D6455}"/>
+              </a:ext>
+            </a:extLst>
+          </p:cNvPr>
+          <p:cNvSpPr txBox="1"/>
+          <p:nvPr/>
+        </p:nvSpPr>
+        <p:spPr>
+          <a:xfrm>
+            <a:off x="1597891" y="4775354"/>
+            <a:ext cx="2447637" cy="461665"/>
+          </a:xfrm>
+          <a:prstGeom prst="rect">
+            <a:avLst/>
+          </a:prstGeom>
+          <a:noFill/>
+        </p:spPr>
+        <p:txBody>
+          <a:bodyPr wrap="square" rtlCol="0">
+            <a:spAutoFit/>
+          </a:bodyPr>
+          <a:lstStyle/>
+          <a:p>
+            <a:r>
+              <a:rPr lang="en-US" sz="2400" b="1" dirty="0">
+                <a:solidFill>
+                  <a:srgbClr val="FF0000"/>
+                </a:solidFill>
+              </a:rPr>
+              <a:t>Baseline  ≈ 1000</a:t>
+            </a:r>
+          </a:p>
+        </p:txBody>
+      </p:sp>
+    </p:spTree>
+    <p:extLst>
+      <p:ext uri="{BB962C8B-B14F-4D97-AF65-F5344CB8AC3E}">
+        <p14:creationId xmlns:p14="http://schemas.microsoft.com/office/powerpoint/2010/main" val="555463728"/>
+      </p:ext>
+    </p:extLst>
+  </p:cSld>
+  <p:clrMapOvr>
+    <a:masterClrMapping/>
+  </p:clrMapOvr>
+</p:sld>
+</file>
+
 <file path=ppt/theme/theme1.xml><?xml version="1.0" encoding="utf-8"?>
 <a:theme xmlns:a="http://schemas.openxmlformats.org/drawingml/2006/main" name="Thème Office">
   <a:themeElements>

</xml_diff>

<commit_message>
tutorial: finalizing examples library generation
</commit_message>
<xml_diff>
--- a/inst/tmp.pptx
+++ b/inst/tmp.pptx
@@ -10,6 +10,8 @@
     <p:sldId id="257" r:id="rId4"/>
     <p:sldId id="259" r:id="rId5"/>
     <p:sldId id="260" r:id="rId6"/>
+    <p:sldId id="261" r:id="rId7"/>
+    <p:sldId id="262" r:id="rId8"/>
   </p:sldIdLst>
   <p:sldSz cx="12192000" cy="6858000"/>
   <p:notesSz cx="6858000" cy="9144000"/>
@@ -265,7 +267,7 @@
           <a:p>
             <a:fld id="{63C097CE-CE30-40FD-8349-F85D75ED7B0A}" type="datetimeFigureOut">
               <a:rPr lang="en-US" smtClean="0"/>
-              <a:t>8/7/2018</a:t>
+              <a:t>8/8/2018</a:t>
             </a:fld>
             <a:endParaRPr lang="en-US"/>
           </a:p>
@@ -465,7 +467,7 @@
           <a:p>
             <a:fld id="{63C097CE-CE30-40FD-8349-F85D75ED7B0A}" type="datetimeFigureOut">
               <a:rPr lang="en-US" smtClean="0"/>
-              <a:t>8/7/2018</a:t>
+              <a:t>8/8/2018</a:t>
             </a:fld>
             <a:endParaRPr lang="en-US"/>
           </a:p>
@@ -675,7 +677,7 @@
           <a:p>
             <a:fld id="{63C097CE-CE30-40FD-8349-F85D75ED7B0A}" type="datetimeFigureOut">
               <a:rPr lang="en-US" smtClean="0"/>
-              <a:t>8/7/2018</a:t>
+              <a:t>8/8/2018</a:t>
             </a:fld>
             <a:endParaRPr lang="en-US"/>
           </a:p>
@@ -875,7 +877,7 @@
           <a:p>
             <a:fld id="{63C097CE-CE30-40FD-8349-F85D75ED7B0A}" type="datetimeFigureOut">
               <a:rPr lang="en-US" smtClean="0"/>
-              <a:t>8/7/2018</a:t>
+              <a:t>8/8/2018</a:t>
             </a:fld>
             <a:endParaRPr lang="en-US"/>
           </a:p>
@@ -1151,7 +1153,7 @@
           <a:p>
             <a:fld id="{63C097CE-CE30-40FD-8349-F85D75ED7B0A}" type="datetimeFigureOut">
               <a:rPr lang="en-US" smtClean="0"/>
-              <a:t>8/7/2018</a:t>
+              <a:t>8/8/2018</a:t>
             </a:fld>
             <a:endParaRPr lang="en-US"/>
           </a:p>
@@ -1419,7 +1421,7 @@
           <a:p>
             <a:fld id="{63C097CE-CE30-40FD-8349-F85D75ED7B0A}" type="datetimeFigureOut">
               <a:rPr lang="en-US" smtClean="0"/>
-              <a:t>8/7/2018</a:t>
+              <a:t>8/8/2018</a:t>
             </a:fld>
             <a:endParaRPr lang="en-US"/>
           </a:p>
@@ -1834,7 +1836,7 @@
           <a:p>
             <a:fld id="{63C097CE-CE30-40FD-8349-F85D75ED7B0A}" type="datetimeFigureOut">
               <a:rPr lang="en-US" smtClean="0"/>
-              <a:t>8/7/2018</a:t>
+              <a:t>8/8/2018</a:t>
             </a:fld>
             <a:endParaRPr lang="en-US"/>
           </a:p>
@@ -1976,7 +1978,7 @@
           <a:p>
             <a:fld id="{63C097CE-CE30-40FD-8349-F85D75ED7B0A}" type="datetimeFigureOut">
               <a:rPr lang="en-US" smtClean="0"/>
-              <a:t>8/7/2018</a:t>
+              <a:t>8/8/2018</a:t>
             </a:fld>
             <a:endParaRPr lang="en-US"/>
           </a:p>
@@ -2089,7 +2091,7 @@
           <a:p>
             <a:fld id="{63C097CE-CE30-40FD-8349-F85D75ED7B0A}" type="datetimeFigureOut">
               <a:rPr lang="en-US" smtClean="0"/>
-              <a:t>8/7/2018</a:t>
+              <a:t>8/8/2018</a:t>
             </a:fld>
             <a:endParaRPr lang="en-US"/>
           </a:p>
@@ -2402,7 +2404,7 @@
           <a:p>
             <a:fld id="{63C097CE-CE30-40FD-8349-F85D75ED7B0A}" type="datetimeFigureOut">
               <a:rPr lang="en-US" smtClean="0"/>
-              <a:t>8/7/2018</a:t>
+              <a:t>8/8/2018</a:t>
             </a:fld>
             <a:endParaRPr lang="en-US"/>
           </a:p>
@@ -2691,7 +2693,7 @@
           <a:p>
             <a:fld id="{63C097CE-CE30-40FD-8349-F85D75ED7B0A}" type="datetimeFigureOut">
               <a:rPr lang="en-US" smtClean="0"/>
-              <a:t>8/7/2018</a:t>
+              <a:t>8/8/2018</a:t>
             </a:fld>
             <a:endParaRPr lang="en-US"/>
           </a:p>
@@ -2934,7 +2936,7 @@
           <a:p>
             <a:fld id="{63C097CE-CE30-40FD-8349-F85D75ED7B0A}" type="datetimeFigureOut">
               <a:rPr lang="en-US" smtClean="0"/>
-              <a:t>8/7/2018</a:t>
+              <a:t>8/8/2018</a:t>
             </a:fld>
             <a:endParaRPr lang="en-US"/>
           </a:p>
@@ -7331,6 +7333,1774 @@
 </p:sld>
 </file>
 
+<file path=ppt/slides/slide6.xml><?xml version="1.0" encoding="utf-8"?>
+<p:sld xmlns:a="http://schemas.openxmlformats.org/drawingml/2006/main" xmlns:r="http://schemas.openxmlformats.org/officeDocument/2006/relationships" xmlns:p="http://schemas.openxmlformats.org/presentationml/2006/main">
+  <p:cSld>
+    <p:spTree>
+      <p:nvGrpSpPr>
+        <p:cNvPr id="1" name=""/>
+        <p:cNvGrpSpPr/>
+        <p:nvPr/>
+      </p:nvGrpSpPr>
+      <p:grpSpPr>
+        <a:xfrm>
+          <a:off x="0" y="0"/>
+          <a:ext cx="0" cy="0"/>
+          <a:chOff x="0" y="0"/>
+          <a:chExt cx="0" cy="0"/>
+        </a:xfrm>
+      </p:grpSpPr>
+      <p:sp>
+        <p:nvSpPr>
+          <p:cNvPr id="78" name="Rectangle 77">
+            <a:extLst>
+              <a:ext uri="{FF2B5EF4-FFF2-40B4-BE49-F238E27FC236}">
+                <a16:creationId xmlns:a16="http://schemas.microsoft.com/office/drawing/2014/main" id="{03406A81-9E7C-434C-B47E-98F1D751956B}"/>
+              </a:ext>
+            </a:extLst>
+          </p:cNvPr>
+          <p:cNvSpPr/>
+          <p:nvPr/>
+        </p:nvSpPr>
+        <p:spPr>
+          <a:xfrm>
+            <a:off x="472272" y="5419"/>
+            <a:ext cx="10335279" cy="6852581"/>
+          </a:xfrm>
+          <a:prstGeom prst="rect">
+            <a:avLst/>
+          </a:prstGeom>
+          <a:solidFill>
+            <a:schemeClr val="bg1"/>
+          </a:solidFill>
+          <a:ln>
+            <a:solidFill>
+              <a:schemeClr val="bg1"/>
+            </a:solidFill>
+          </a:ln>
+        </p:spPr>
+        <p:style>
+          <a:lnRef idx="2">
+            <a:schemeClr val="accent1">
+              <a:shade val="50000"/>
+            </a:schemeClr>
+          </a:lnRef>
+          <a:fillRef idx="1">
+            <a:schemeClr val="accent1"/>
+          </a:fillRef>
+          <a:effectRef idx="0">
+            <a:schemeClr val="accent1"/>
+          </a:effectRef>
+          <a:fontRef idx="minor">
+            <a:schemeClr val="lt1"/>
+          </a:fontRef>
+        </p:style>
+        <p:txBody>
+          <a:bodyPr rtlCol="0" anchor="ctr"/>
+          <a:lstStyle/>
+          <a:p>
+            <a:pPr algn="ctr"/>
+            <a:endParaRPr lang="en-US"/>
+          </a:p>
+        </p:txBody>
+      </p:sp>
+      <p:pic>
+        <p:nvPicPr>
+          <p:cNvPr id="71" name="Image 70">
+            <a:extLst>
+              <a:ext uri="{FF2B5EF4-FFF2-40B4-BE49-F238E27FC236}">
+                <a16:creationId xmlns:a16="http://schemas.microsoft.com/office/drawing/2014/main" id="{0569A8FB-C979-47B4-8A67-8499D0F60167}"/>
+              </a:ext>
+            </a:extLst>
+          </p:cNvPr>
+          <p:cNvPicPr>
+            <a:picLocks noChangeAspect="1"/>
+          </p:cNvPicPr>
+          <p:nvPr/>
+        </p:nvPicPr>
+        <p:blipFill>
+          <a:blip r:embed="rId2"/>
+          <a:stretch>
+            <a:fillRect/>
+          </a:stretch>
+        </p:blipFill>
+        <p:spPr>
+          <a:xfrm>
+            <a:off x="5477377" y="3004988"/>
+            <a:ext cx="5105123" cy="2487379"/>
+          </a:xfrm>
+          <a:prstGeom prst="rect">
+            <a:avLst/>
+          </a:prstGeom>
+        </p:spPr>
+      </p:pic>
+      <p:pic>
+        <p:nvPicPr>
+          <p:cNvPr id="3" name="Image 2">
+            <a:extLst>
+              <a:ext uri="{FF2B5EF4-FFF2-40B4-BE49-F238E27FC236}">
+                <a16:creationId xmlns:a16="http://schemas.microsoft.com/office/drawing/2014/main" id="{6441B122-5C80-4158-AB15-A34346CA7F40}"/>
+              </a:ext>
+            </a:extLst>
+          </p:cNvPr>
+          <p:cNvPicPr>
+            <a:picLocks noChangeAspect="1"/>
+          </p:cNvPicPr>
+          <p:nvPr/>
+        </p:nvPicPr>
+        <p:blipFill rotWithShape="1">
+          <a:blip r:embed="rId3"/>
+          <a:srcRect t="1824" r="3361" b="9244"/>
+          <a:stretch/>
+        </p:blipFill>
+        <p:spPr>
+          <a:xfrm>
+            <a:off x="1256198" y="174113"/>
+            <a:ext cx="5260480" cy="2289509"/>
+          </a:xfrm>
+          <a:prstGeom prst="rect">
+            <a:avLst/>
+          </a:prstGeom>
+          <a:ln w="28575">
+            <a:solidFill>
+              <a:schemeClr val="tx1"/>
+            </a:solidFill>
+          </a:ln>
+        </p:spPr>
+      </p:pic>
+      <p:sp>
+        <p:nvSpPr>
+          <p:cNvPr id="8" name="ZoneTexte 7">
+            <a:extLst>
+              <a:ext uri="{FF2B5EF4-FFF2-40B4-BE49-F238E27FC236}">
+                <a16:creationId xmlns:a16="http://schemas.microsoft.com/office/drawing/2014/main" id="{7813EC17-F8C4-4085-9A1C-E31AC58D9D20}"/>
+              </a:ext>
+            </a:extLst>
+          </p:cNvPr>
+          <p:cNvSpPr txBox="1"/>
+          <p:nvPr/>
+        </p:nvSpPr>
+        <p:spPr>
+          <a:xfrm>
+            <a:off x="4903650" y="2775850"/>
+            <a:ext cx="604565" cy="461665"/>
+          </a:xfrm>
+          <a:prstGeom prst="rect">
+            <a:avLst/>
+          </a:prstGeom>
+          <a:noFill/>
+        </p:spPr>
+        <p:txBody>
+          <a:bodyPr wrap="square" rtlCol="0">
+            <a:spAutoFit/>
+          </a:bodyPr>
+          <a:lstStyle/>
+          <a:p>
+            <a:pPr algn="ctr"/>
+            <a:r>
+              <a:rPr lang="en-US" sz="2400" dirty="0"/>
+              <a:t>…</a:t>
+            </a:r>
+          </a:p>
+        </p:txBody>
+      </p:sp>
+      <p:sp>
+        <p:nvSpPr>
+          <p:cNvPr id="10" name="ZoneTexte 9">
+            <a:extLst>
+              <a:ext uri="{FF2B5EF4-FFF2-40B4-BE49-F238E27FC236}">
+                <a16:creationId xmlns:a16="http://schemas.microsoft.com/office/drawing/2014/main" id="{90CA22D0-0131-4E86-A2BD-0E378D3E3DD0}"/>
+              </a:ext>
+            </a:extLst>
+          </p:cNvPr>
+          <p:cNvSpPr txBox="1"/>
+          <p:nvPr/>
+        </p:nvSpPr>
+        <p:spPr>
+          <a:xfrm>
+            <a:off x="4735168" y="3933107"/>
+            <a:ext cx="941531" cy="461665"/>
+          </a:xfrm>
+          <a:prstGeom prst="rect">
+            <a:avLst/>
+          </a:prstGeom>
+          <a:noFill/>
+        </p:spPr>
+        <p:txBody>
+          <a:bodyPr wrap="square" rtlCol="0">
+            <a:spAutoFit/>
+          </a:bodyPr>
+          <a:lstStyle/>
+          <a:p>
+            <a:pPr algn="ctr"/>
+            <a:r>
+              <a:rPr lang="en-US" sz="2400" dirty="0"/>
+              <a:t>…</a:t>
+            </a:r>
+          </a:p>
+        </p:txBody>
+      </p:sp>
+      <p:sp>
+        <p:nvSpPr>
+          <p:cNvPr id="12" name="ZoneTexte 11">
+            <a:extLst>
+              <a:ext uri="{FF2B5EF4-FFF2-40B4-BE49-F238E27FC236}">
+                <a16:creationId xmlns:a16="http://schemas.microsoft.com/office/drawing/2014/main" id="{67CF0401-36AF-4ED8-9295-83E81D8AD96E}"/>
+              </a:ext>
+            </a:extLst>
+          </p:cNvPr>
+          <p:cNvSpPr txBox="1"/>
+          <p:nvPr/>
+        </p:nvSpPr>
+        <p:spPr>
+          <a:xfrm>
+            <a:off x="5560581" y="5498507"/>
+            <a:ext cx="3860472" cy="369332"/>
+          </a:xfrm>
+          <a:prstGeom prst="rect">
+            <a:avLst/>
+          </a:prstGeom>
+          <a:noFill/>
+        </p:spPr>
+        <p:txBody>
+          <a:bodyPr wrap="square" rtlCol="0">
+            <a:spAutoFit/>
+          </a:bodyPr>
+          <a:lstStyle/>
+          <a:p>
+            <a:r>
+              <a:rPr lang="en-US" dirty="0">
+                <a:solidFill>
+                  <a:srgbClr val="FF0000"/>
+                </a:solidFill>
+              </a:rPr>
+              <a:t>F</a:t>
+            </a:r>
+            <a:r>
+              <a:rPr lang="en-US" altLang="zh-CN" dirty="0">
+                <a:solidFill>
+                  <a:srgbClr val="FF0000"/>
+                </a:solidFill>
+              </a:rPr>
+              <a:t>ollowing metadata columns are added</a:t>
+            </a:r>
+            <a:endParaRPr lang="en-US" dirty="0">
+              <a:solidFill>
+                <a:srgbClr val="FF0000"/>
+              </a:solidFill>
+            </a:endParaRPr>
+          </a:p>
+        </p:txBody>
+      </p:sp>
+      <p:sp>
+        <p:nvSpPr>
+          <p:cNvPr id="22" name="ZoneTexte 21">
+            <a:extLst>
+              <a:ext uri="{FF2B5EF4-FFF2-40B4-BE49-F238E27FC236}">
+                <a16:creationId xmlns:a16="http://schemas.microsoft.com/office/drawing/2014/main" id="{935795B6-F2ED-4924-A5EF-B2BE173A6655}"/>
+              </a:ext>
+            </a:extLst>
+          </p:cNvPr>
+          <p:cNvSpPr txBox="1"/>
+          <p:nvPr/>
+        </p:nvSpPr>
+        <p:spPr>
+          <a:xfrm>
+            <a:off x="652187" y="2492600"/>
+            <a:ext cx="1351088" cy="369332"/>
+          </a:xfrm>
+          <a:prstGeom prst="rect">
+            <a:avLst/>
+          </a:prstGeom>
+          <a:noFill/>
+        </p:spPr>
+        <p:txBody>
+          <a:bodyPr wrap="square" rtlCol="0">
+            <a:spAutoFit/>
+          </a:bodyPr>
+          <a:lstStyle/>
+          <a:p>
+            <a:r>
+              <a:rPr lang="en-US" dirty="0">
+                <a:solidFill>
+                  <a:srgbClr val="FF0000"/>
+                </a:solidFill>
+              </a:rPr>
+              <a:t>Meta data</a:t>
+            </a:r>
+          </a:p>
+        </p:txBody>
+      </p:sp>
+      <p:sp>
+        <p:nvSpPr>
+          <p:cNvPr id="24" name="ZoneTexte 23">
+            <a:extLst>
+              <a:ext uri="{FF2B5EF4-FFF2-40B4-BE49-F238E27FC236}">
+                <a16:creationId xmlns:a16="http://schemas.microsoft.com/office/drawing/2014/main" id="{5C028F4F-4373-4D7B-B3F7-C9B9214C7865}"/>
+              </a:ext>
+            </a:extLst>
+          </p:cNvPr>
+          <p:cNvSpPr txBox="1"/>
+          <p:nvPr/>
+        </p:nvSpPr>
+        <p:spPr>
+          <a:xfrm>
+            <a:off x="9027000" y="2077556"/>
+            <a:ext cx="1542997" cy="369332"/>
+          </a:xfrm>
+          <a:prstGeom prst="rect">
+            <a:avLst/>
+          </a:prstGeom>
+          <a:noFill/>
+        </p:spPr>
+        <p:txBody>
+          <a:bodyPr wrap="square" rtlCol="0">
+            <a:spAutoFit/>
+          </a:bodyPr>
+          <a:lstStyle/>
+          <a:p>
+            <a:r>
+              <a:rPr lang="en-US" i="1" dirty="0">
+                <a:solidFill>
+                  <a:srgbClr val="FF0000"/>
+                </a:solidFill>
+              </a:rPr>
+              <a:t>Spectra data</a:t>
+            </a:r>
+          </a:p>
+        </p:txBody>
+      </p:sp>
+      <p:pic>
+        <p:nvPicPr>
+          <p:cNvPr id="41" name="Image 40">
+            <a:extLst>
+              <a:ext uri="{FF2B5EF4-FFF2-40B4-BE49-F238E27FC236}">
+                <a16:creationId xmlns:a16="http://schemas.microsoft.com/office/drawing/2014/main" id="{E012CF8E-8D48-4C4A-8CA0-1986C6096E61}"/>
+              </a:ext>
+            </a:extLst>
+          </p:cNvPr>
+          <p:cNvPicPr>
+            <a:picLocks noChangeAspect="1"/>
+          </p:cNvPicPr>
+          <p:nvPr/>
+        </p:nvPicPr>
+        <p:blipFill>
+          <a:blip r:embed="rId4"/>
+          <a:stretch>
+            <a:fillRect/>
+          </a:stretch>
+        </p:blipFill>
+        <p:spPr>
+          <a:xfrm>
+            <a:off x="1188147" y="3003114"/>
+            <a:ext cx="3771787" cy="2492166"/>
+          </a:xfrm>
+          <a:prstGeom prst="rect">
+            <a:avLst/>
+          </a:prstGeom>
+        </p:spPr>
+      </p:pic>
+      <p:sp>
+        <p:nvSpPr>
+          <p:cNvPr id="45" name="Forme libre : forme 44">
+            <a:extLst>
+              <a:ext uri="{FF2B5EF4-FFF2-40B4-BE49-F238E27FC236}">
+                <a16:creationId xmlns:a16="http://schemas.microsoft.com/office/drawing/2014/main" id="{85736300-E6E6-4539-813C-418D7BB194CA}"/>
+              </a:ext>
+            </a:extLst>
+          </p:cNvPr>
+          <p:cNvSpPr/>
+          <p:nvPr/>
+        </p:nvSpPr>
+        <p:spPr>
+          <a:xfrm>
+            <a:off x="546575" y="1922101"/>
+            <a:ext cx="1147432" cy="1367803"/>
+          </a:xfrm>
+          <a:custGeom>
+            <a:avLst/>
+            <a:gdLst>
+              <a:gd name="connsiteX0" fmla="*/ 1086082 w 1086082"/>
+              <a:gd name="connsiteY0" fmla="*/ 0 h 1395167"/>
+              <a:gd name="connsiteX1" fmla="*/ 2000 w 1086082"/>
+              <a:gd name="connsiteY1" fmla="*/ 735291 h 1395167"/>
+              <a:gd name="connsiteX2" fmla="*/ 822132 w 1086082"/>
+              <a:gd name="connsiteY2" fmla="*/ 1395167 h 1395167"/>
+            </a:gdLst>
+            <a:ahLst/>
+            <a:cxnLst>
+              <a:cxn ang="0">
+                <a:pos x="connsiteX0" y="connsiteY0"/>
+              </a:cxn>
+              <a:cxn ang="0">
+                <a:pos x="connsiteX1" y="connsiteY1"/>
+              </a:cxn>
+              <a:cxn ang="0">
+                <a:pos x="connsiteX2" y="connsiteY2"/>
+              </a:cxn>
+            </a:cxnLst>
+            <a:rect l="l" t="t" r="r" b="b"/>
+            <a:pathLst>
+              <a:path w="1086082" h="1395167">
+                <a:moveTo>
+                  <a:pt x="1086082" y="0"/>
+                </a:moveTo>
+                <a:cubicBezTo>
+                  <a:pt x="566037" y="251381"/>
+                  <a:pt x="45992" y="502763"/>
+                  <a:pt x="2000" y="735291"/>
+                </a:cubicBezTo>
+                <a:cubicBezTo>
+                  <a:pt x="-41992" y="967819"/>
+                  <a:pt x="652450" y="1271048"/>
+                  <a:pt x="822132" y="1395167"/>
+                </a:cubicBezTo>
+              </a:path>
+            </a:pathLst>
+          </a:custGeom>
+          <a:noFill/>
+          <a:ln w="28575">
+            <a:solidFill>
+              <a:srgbClr val="FF0000"/>
+            </a:solidFill>
+            <a:headEnd type="none" w="med" len="med"/>
+            <a:tailEnd type="arrow" w="med" len="med"/>
+          </a:ln>
+        </p:spPr>
+        <p:style>
+          <a:lnRef idx="2">
+            <a:schemeClr val="accent1">
+              <a:shade val="50000"/>
+            </a:schemeClr>
+          </a:lnRef>
+          <a:fillRef idx="1">
+            <a:schemeClr val="accent1"/>
+          </a:fillRef>
+          <a:effectRef idx="0">
+            <a:schemeClr val="accent1"/>
+          </a:effectRef>
+          <a:fontRef idx="minor">
+            <a:schemeClr val="lt1"/>
+          </a:fontRef>
+        </p:style>
+        <p:txBody>
+          <a:bodyPr rtlCol="0" anchor="ctr"/>
+          <a:lstStyle/>
+          <a:p>
+            <a:pPr algn="ctr"/>
+            <a:endParaRPr lang="en-US"/>
+          </a:p>
+        </p:txBody>
+      </p:sp>
+      <p:sp>
+        <p:nvSpPr>
+          <p:cNvPr id="46" name="Rectangle : coins arrondis 45">
+            <a:extLst>
+              <a:ext uri="{FF2B5EF4-FFF2-40B4-BE49-F238E27FC236}">
+                <a16:creationId xmlns:a16="http://schemas.microsoft.com/office/drawing/2014/main" id="{3B181BFD-CF84-4A54-A0F3-2AFCB1C5CFE2}"/>
+              </a:ext>
+            </a:extLst>
+          </p:cNvPr>
+          <p:cNvSpPr/>
+          <p:nvPr/>
+        </p:nvSpPr>
+        <p:spPr>
+          <a:xfrm>
+            <a:off x="4161368" y="4919275"/>
+            <a:ext cx="2056110" cy="352950"/>
+          </a:xfrm>
+          <a:prstGeom prst="roundRect">
+            <a:avLst/>
+          </a:prstGeom>
+          <a:noFill/>
+          <a:ln>
+            <a:solidFill>
+              <a:srgbClr val="0070C0"/>
+            </a:solidFill>
+          </a:ln>
+        </p:spPr>
+        <p:style>
+          <a:lnRef idx="2">
+            <a:schemeClr val="accent1">
+              <a:shade val="50000"/>
+            </a:schemeClr>
+          </a:lnRef>
+          <a:fillRef idx="1">
+            <a:schemeClr val="accent1"/>
+          </a:fillRef>
+          <a:effectRef idx="0">
+            <a:schemeClr val="accent1"/>
+          </a:effectRef>
+          <a:fontRef idx="minor">
+            <a:schemeClr val="lt1"/>
+          </a:fontRef>
+        </p:style>
+        <p:txBody>
+          <a:bodyPr rtlCol="0" anchor="ctr"/>
+          <a:lstStyle/>
+          <a:p>
+            <a:pPr algn="ctr"/>
+            <a:endParaRPr lang="en-US"/>
+          </a:p>
+        </p:txBody>
+      </p:sp>
+      <p:sp>
+        <p:nvSpPr>
+          <p:cNvPr id="28" name="Rectangle : coins arrondis 27">
+            <a:extLst>
+              <a:ext uri="{FF2B5EF4-FFF2-40B4-BE49-F238E27FC236}">
+                <a16:creationId xmlns:a16="http://schemas.microsoft.com/office/drawing/2014/main" id="{87860E08-9A61-42C9-B1CF-C9E07D79939B}"/>
+              </a:ext>
+            </a:extLst>
+          </p:cNvPr>
+          <p:cNvSpPr/>
+          <p:nvPr/>
+        </p:nvSpPr>
+        <p:spPr>
+          <a:xfrm>
+            <a:off x="1188145" y="4386995"/>
+            <a:ext cx="9369343" cy="208159"/>
+          </a:xfrm>
+          <a:prstGeom prst="roundRect">
+            <a:avLst/>
+          </a:prstGeom>
+          <a:noFill/>
+          <a:ln>
+            <a:solidFill>
+              <a:srgbClr val="0070C0"/>
+            </a:solidFill>
+          </a:ln>
+        </p:spPr>
+        <p:style>
+          <a:lnRef idx="2">
+            <a:schemeClr val="accent1">
+              <a:shade val="50000"/>
+            </a:schemeClr>
+          </a:lnRef>
+          <a:fillRef idx="1">
+            <a:schemeClr val="accent1"/>
+          </a:fillRef>
+          <a:effectRef idx="0">
+            <a:schemeClr val="accent1"/>
+          </a:effectRef>
+          <a:fontRef idx="minor">
+            <a:schemeClr val="lt1"/>
+          </a:fontRef>
+        </p:style>
+        <p:txBody>
+          <a:bodyPr rtlCol="0" anchor="ctr"/>
+          <a:lstStyle/>
+          <a:p>
+            <a:pPr algn="ctr"/>
+            <a:endParaRPr lang="en-US"/>
+          </a:p>
+        </p:txBody>
+      </p:sp>
+      <p:sp>
+        <p:nvSpPr>
+          <p:cNvPr id="52" name="ZoneTexte 51">
+            <a:extLst>
+              <a:ext uri="{FF2B5EF4-FFF2-40B4-BE49-F238E27FC236}">
+                <a16:creationId xmlns:a16="http://schemas.microsoft.com/office/drawing/2014/main" id="{DAE24555-3B54-4BAD-B93A-7336AB6F9078}"/>
+              </a:ext>
+            </a:extLst>
+          </p:cNvPr>
+          <p:cNvSpPr txBox="1"/>
+          <p:nvPr/>
+        </p:nvSpPr>
+        <p:spPr>
+          <a:xfrm>
+            <a:off x="3235040" y="1313607"/>
+            <a:ext cx="3200957" cy="369332"/>
+          </a:xfrm>
+          <a:prstGeom prst="rect">
+            <a:avLst/>
+          </a:prstGeom>
+          <a:noFill/>
+        </p:spPr>
+        <p:txBody>
+          <a:bodyPr wrap="square" rtlCol="0">
+            <a:spAutoFit/>
+          </a:bodyPr>
+          <a:lstStyle/>
+          <a:p>
+            <a:r>
+              <a:rPr lang="en-US" dirty="0">
+                <a:solidFill>
+                  <a:srgbClr val="FF0000"/>
+                </a:solidFill>
+              </a:rPr>
+              <a:t>GNPS-style spectral library file</a:t>
+            </a:r>
+          </a:p>
+        </p:txBody>
+      </p:sp>
+      <p:cxnSp>
+        <p:nvCxnSpPr>
+          <p:cNvPr id="53" name="Connecteur droit avec flèche 52">
+            <a:extLst>
+              <a:ext uri="{FF2B5EF4-FFF2-40B4-BE49-F238E27FC236}">
+                <a16:creationId xmlns:a16="http://schemas.microsoft.com/office/drawing/2014/main" id="{A3533E91-5E66-46B5-9748-247863DD420B}"/>
+              </a:ext>
+            </a:extLst>
+          </p:cNvPr>
+          <p:cNvCxnSpPr>
+            <a:cxnSpLocks/>
+          </p:cNvCxnSpPr>
+          <p:nvPr/>
+        </p:nvCxnSpPr>
+        <p:spPr>
+          <a:xfrm flipH="1">
+            <a:off x="4410776" y="5287930"/>
+            <a:ext cx="101619" cy="330952"/>
+          </a:xfrm>
+          <a:prstGeom prst="straightConnector1">
+            <a:avLst/>
+          </a:prstGeom>
+          <a:ln>
+            <a:tailEnd type="triangle"/>
+          </a:ln>
+        </p:spPr>
+        <p:style>
+          <a:lnRef idx="1">
+            <a:schemeClr val="accent1"/>
+          </a:lnRef>
+          <a:fillRef idx="0">
+            <a:schemeClr val="accent1"/>
+          </a:fillRef>
+          <a:effectRef idx="0">
+            <a:schemeClr val="accent1"/>
+          </a:effectRef>
+          <a:fontRef idx="minor">
+            <a:schemeClr val="tx1"/>
+          </a:fontRef>
+        </p:style>
+      </p:cxnSp>
+      <p:cxnSp>
+        <p:nvCxnSpPr>
+          <p:cNvPr id="56" name="Connecteur droit 55">
+            <a:extLst>
+              <a:ext uri="{FF2B5EF4-FFF2-40B4-BE49-F238E27FC236}">
+                <a16:creationId xmlns:a16="http://schemas.microsoft.com/office/drawing/2014/main" id="{04911FDB-6E6C-4760-900D-CCBA5FD281C3}"/>
+              </a:ext>
+            </a:extLst>
+          </p:cNvPr>
+          <p:cNvCxnSpPr>
+            <a:cxnSpLocks/>
+          </p:cNvCxnSpPr>
+          <p:nvPr/>
+        </p:nvCxnSpPr>
+        <p:spPr>
+          <a:xfrm>
+            <a:off x="5477377" y="2957068"/>
+            <a:ext cx="0" cy="2859419"/>
+          </a:xfrm>
+          <a:prstGeom prst="line">
+            <a:avLst/>
+          </a:prstGeom>
+          <a:ln w="19050">
+            <a:solidFill>
+              <a:srgbClr val="FF0000"/>
+            </a:solidFill>
+          </a:ln>
+        </p:spPr>
+        <p:style>
+          <a:lnRef idx="1">
+            <a:schemeClr val="accent1"/>
+          </a:lnRef>
+          <a:fillRef idx="0">
+            <a:schemeClr val="accent1"/>
+          </a:fillRef>
+          <a:effectRef idx="0">
+            <a:schemeClr val="accent1"/>
+          </a:effectRef>
+          <a:fontRef idx="minor">
+            <a:schemeClr val="tx1"/>
+          </a:fontRef>
+        </p:style>
+      </p:cxnSp>
+      <p:cxnSp>
+        <p:nvCxnSpPr>
+          <p:cNvPr id="57" name="Connecteur droit 56">
+            <a:extLst>
+              <a:ext uri="{FF2B5EF4-FFF2-40B4-BE49-F238E27FC236}">
+                <a16:creationId xmlns:a16="http://schemas.microsoft.com/office/drawing/2014/main" id="{E2665E2A-F00F-4AF1-9A51-E4CB1821B9A6}"/>
+              </a:ext>
+            </a:extLst>
+          </p:cNvPr>
+          <p:cNvCxnSpPr/>
+          <p:nvPr/>
+        </p:nvCxnSpPr>
+        <p:spPr>
+          <a:xfrm>
+            <a:off x="10569997" y="2957068"/>
+            <a:ext cx="0" cy="2859419"/>
+          </a:xfrm>
+          <a:prstGeom prst="line">
+            <a:avLst/>
+          </a:prstGeom>
+          <a:ln w="19050">
+            <a:solidFill>
+              <a:srgbClr val="FF0000"/>
+            </a:solidFill>
+          </a:ln>
+        </p:spPr>
+        <p:style>
+          <a:lnRef idx="1">
+            <a:schemeClr val="accent1"/>
+          </a:lnRef>
+          <a:fillRef idx="0">
+            <a:schemeClr val="accent1"/>
+          </a:fillRef>
+          <a:effectRef idx="0">
+            <a:schemeClr val="accent1"/>
+          </a:effectRef>
+          <a:fontRef idx="minor">
+            <a:schemeClr val="tx1"/>
+          </a:fontRef>
+        </p:style>
+      </p:cxnSp>
+      <p:sp>
+        <p:nvSpPr>
+          <p:cNvPr id="60" name="ZoneTexte 59">
+            <a:extLst>
+              <a:ext uri="{FF2B5EF4-FFF2-40B4-BE49-F238E27FC236}">
+                <a16:creationId xmlns:a16="http://schemas.microsoft.com/office/drawing/2014/main" id="{B1DA18EC-3F80-4A32-9AD9-E042EC55B4E1}"/>
+              </a:ext>
+            </a:extLst>
+          </p:cNvPr>
+          <p:cNvSpPr txBox="1"/>
+          <p:nvPr/>
+        </p:nvSpPr>
+        <p:spPr>
+          <a:xfrm>
+            <a:off x="3569998" y="5580856"/>
+            <a:ext cx="1928088" cy="738664"/>
+          </a:xfrm>
+          <a:prstGeom prst="rect">
+            <a:avLst/>
+          </a:prstGeom>
+          <a:noFill/>
+        </p:spPr>
+        <p:txBody>
+          <a:bodyPr wrap="square" rtlCol="0">
+            <a:spAutoFit/>
+          </a:bodyPr>
+          <a:lstStyle/>
+          <a:p>
+            <a:r>
+              <a:rPr lang="en-US" sz="1400" i="1" dirty="0">
+                <a:solidFill>
+                  <a:srgbClr val="4472C4"/>
+                </a:solidFill>
+              </a:rPr>
+              <a:t>MS1 and MS2 scans are both detected for feature ID=8</a:t>
+            </a:r>
+          </a:p>
+        </p:txBody>
+      </p:sp>
+      <p:pic>
+        <p:nvPicPr>
+          <p:cNvPr id="61" name="Image 60">
+            <a:extLst>
+              <a:ext uri="{FF2B5EF4-FFF2-40B4-BE49-F238E27FC236}">
+                <a16:creationId xmlns:a16="http://schemas.microsoft.com/office/drawing/2014/main" id="{47DDCEF7-BA9E-4FDA-860A-4FF7A48BCF26}"/>
+              </a:ext>
+            </a:extLst>
+          </p:cNvPr>
+          <p:cNvPicPr>
+            <a:picLocks noChangeAspect="1"/>
+          </p:cNvPicPr>
+          <p:nvPr/>
+        </p:nvPicPr>
+        <p:blipFill rotWithShape="1">
+          <a:blip r:embed="rId5"/>
+          <a:srcRect t="1523" r="24557"/>
+          <a:stretch/>
+        </p:blipFill>
+        <p:spPr>
+          <a:xfrm>
+            <a:off x="6916706" y="140798"/>
+            <a:ext cx="1999774" cy="2616802"/>
+          </a:xfrm>
+          <a:prstGeom prst="rect">
+            <a:avLst/>
+          </a:prstGeom>
+        </p:spPr>
+      </p:pic>
+      <p:cxnSp>
+        <p:nvCxnSpPr>
+          <p:cNvPr id="62" name="Connecteur droit avec flèche 61">
+            <a:extLst>
+              <a:ext uri="{FF2B5EF4-FFF2-40B4-BE49-F238E27FC236}">
+                <a16:creationId xmlns:a16="http://schemas.microsoft.com/office/drawing/2014/main" id="{1EB1A78C-15AB-4863-8890-C299D0C82A20}"/>
+              </a:ext>
+            </a:extLst>
+          </p:cNvPr>
+          <p:cNvCxnSpPr>
+            <a:cxnSpLocks/>
+          </p:cNvCxnSpPr>
+          <p:nvPr/>
+        </p:nvCxnSpPr>
+        <p:spPr>
+          <a:xfrm>
+            <a:off x="2894501" y="1682939"/>
+            <a:ext cx="4022205" cy="0"/>
+          </a:xfrm>
+          <a:prstGeom prst="straightConnector1">
+            <a:avLst/>
+          </a:prstGeom>
+          <a:ln w="28575">
+            <a:solidFill>
+              <a:srgbClr val="FF0000"/>
+            </a:solidFill>
+            <a:tailEnd type="triangle"/>
+          </a:ln>
+        </p:spPr>
+        <p:style>
+          <a:lnRef idx="1">
+            <a:schemeClr val="accent1"/>
+          </a:lnRef>
+          <a:fillRef idx="0">
+            <a:schemeClr val="accent1"/>
+          </a:fillRef>
+          <a:effectRef idx="0">
+            <a:schemeClr val="accent1"/>
+          </a:effectRef>
+          <a:fontRef idx="minor">
+            <a:schemeClr val="tx1"/>
+          </a:fontRef>
+        </p:style>
+      </p:cxnSp>
+      <p:cxnSp>
+        <p:nvCxnSpPr>
+          <p:cNvPr id="65" name="Connecteur droit 64">
+            <a:extLst>
+              <a:ext uri="{FF2B5EF4-FFF2-40B4-BE49-F238E27FC236}">
+                <a16:creationId xmlns:a16="http://schemas.microsoft.com/office/drawing/2014/main" id="{F42E9E83-3C0F-4B1B-A887-BA5E65AB9F40}"/>
+              </a:ext>
+            </a:extLst>
+          </p:cNvPr>
+          <p:cNvCxnSpPr/>
+          <p:nvPr/>
+        </p:nvCxnSpPr>
+        <p:spPr>
+          <a:xfrm>
+            <a:off x="8343933" y="140798"/>
+            <a:ext cx="0" cy="1645920"/>
+          </a:xfrm>
+          <a:prstGeom prst="line">
+            <a:avLst/>
+          </a:prstGeom>
+          <a:ln w="19050">
+            <a:solidFill>
+              <a:srgbClr val="FF0000"/>
+            </a:solidFill>
+          </a:ln>
+        </p:spPr>
+        <p:style>
+          <a:lnRef idx="1">
+            <a:schemeClr val="accent1"/>
+          </a:lnRef>
+          <a:fillRef idx="0">
+            <a:schemeClr val="accent1"/>
+          </a:fillRef>
+          <a:effectRef idx="0">
+            <a:schemeClr val="accent1"/>
+          </a:effectRef>
+          <a:fontRef idx="minor">
+            <a:schemeClr val="tx1"/>
+          </a:fontRef>
+        </p:style>
+      </p:cxnSp>
+      <p:sp>
+        <p:nvSpPr>
+          <p:cNvPr id="23" name="ZoneTexte 22">
+            <a:extLst>
+              <a:ext uri="{FF2B5EF4-FFF2-40B4-BE49-F238E27FC236}">
+                <a16:creationId xmlns:a16="http://schemas.microsoft.com/office/drawing/2014/main" id="{944CB714-62F4-4338-8FF0-2C3043047C6A}"/>
+              </a:ext>
+            </a:extLst>
+          </p:cNvPr>
+          <p:cNvSpPr txBox="1"/>
+          <p:nvPr/>
+        </p:nvSpPr>
+        <p:spPr>
+          <a:xfrm>
+            <a:off x="8354247" y="779092"/>
+            <a:ext cx="1144703" cy="369332"/>
+          </a:xfrm>
+          <a:prstGeom prst="rect">
+            <a:avLst/>
+          </a:prstGeom>
+          <a:noFill/>
+        </p:spPr>
+        <p:txBody>
+          <a:bodyPr wrap="square" rtlCol="0">
+            <a:spAutoFit/>
+          </a:bodyPr>
+          <a:lstStyle/>
+          <a:p>
+            <a:r>
+              <a:rPr lang="en-US" i="1" dirty="0">
+                <a:solidFill>
+                  <a:srgbClr val="FF0000"/>
+                </a:solidFill>
+              </a:rPr>
+              <a:t>Metadata</a:t>
+            </a:r>
+          </a:p>
+        </p:txBody>
+      </p:sp>
+      <p:cxnSp>
+        <p:nvCxnSpPr>
+          <p:cNvPr id="66" name="Connecteur droit 65">
+            <a:extLst>
+              <a:ext uri="{FF2B5EF4-FFF2-40B4-BE49-F238E27FC236}">
+                <a16:creationId xmlns:a16="http://schemas.microsoft.com/office/drawing/2014/main" id="{C44EC7A9-4217-4157-A2F9-32820B011670}"/>
+              </a:ext>
+            </a:extLst>
+          </p:cNvPr>
+          <p:cNvCxnSpPr/>
+          <p:nvPr/>
+        </p:nvCxnSpPr>
+        <p:spPr>
+          <a:xfrm>
+            <a:off x="9027001" y="1786718"/>
+            <a:ext cx="0" cy="914400"/>
+          </a:xfrm>
+          <a:prstGeom prst="line">
+            <a:avLst/>
+          </a:prstGeom>
+          <a:ln w="19050">
+            <a:solidFill>
+              <a:srgbClr val="FF0000"/>
+            </a:solidFill>
+          </a:ln>
+        </p:spPr>
+        <p:style>
+          <a:lnRef idx="1">
+            <a:schemeClr val="accent1"/>
+          </a:lnRef>
+          <a:fillRef idx="0">
+            <a:schemeClr val="accent1"/>
+          </a:fillRef>
+          <a:effectRef idx="0">
+            <a:schemeClr val="accent1"/>
+          </a:effectRef>
+          <a:fontRef idx="minor">
+            <a:schemeClr val="tx1"/>
+          </a:fontRef>
+        </p:style>
+      </p:cxnSp>
+      <p:sp>
+        <p:nvSpPr>
+          <p:cNvPr id="37" name="ZoneTexte 36">
+            <a:extLst>
+              <a:ext uri="{FF2B5EF4-FFF2-40B4-BE49-F238E27FC236}">
+                <a16:creationId xmlns:a16="http://schemas.microsoft.com/office/drawing/2014/main" id="{B71716CC-E764-4070-9690-59D68F5530E8}"/>
+              </a:ext>
+            </a:extLst>
+          </p:cNvPr>
+          <p:cNvSpPr txBox="1"/>
+          <p:nvPr/>
+        </p:nvSpPr>
+        <p:spPr>
+          <a:xfrm>
+            <a:off x="7862706" y="2692946"/>
+            <a:ext cx="2252883" cy="369332"/>
+          </a:xfrm>
+          <a:prstGeom prst="rect">
+            <a:avLst/>
+          </a:prstGeom>
+          <a:noFill/>
+        </p:spPr>
+        <p:txBody>
+          <a:bodyPr wrap="square" rtlCol="0">
+            <a:spAutoFit/>
+          </a:bodyPr>
+          <a:lstStyle/>
+          <a:p>
+            <a:pPr algn="ctr"/>
+            <a:r>
+              <a:rPr lang="en-US" i="1" dirty="0">
+                <a:solidFill>
+                  <a:srgbClr val="4472C4"/>
+                </a:solidFill>
+              </a:rPr>
+              <a:t>Example of a “scan”</a:t>
+            </a:r>
+          </a:p>
+        </p:txBody>
+      </p:sp>
+      <p:cxnSp>
+        <p:nvCxnSpPr>
+          <p:cNvPr id="27" name="Connecteur droit avec flèche 26">
+            <a:extLst>
+              <a:ext uri="{FF2B5EF4-FFF2-40B4-BE49-F238E27FC236}">
+                <a16:creationId xmlns:a16="http://schemas.microsoft.com/office/drawing/2014/main" id="{B3AC4EC9-FEFF-4C8C-98F5-70C52E54F6EA}"/>
+              </a:ext>
+            </a:extLst>
+          </p:cNvPr>
+          <p:cNvCxnSpPr>
+            <a:cxnSpLocks/>
+          </p:cNvCxnSpPr>
+          <p:nvPr/>
+        </p:nvCxnSpPr>
+        <p:spPr>
+          <a:xfrm flipV="1">
+            <a:off x="7612117" y="2446888"/>
+            <a:ext cx="501178" cy="1939890"/>
+          </a:xfrm>
+          <a:prstGeom prst="straightConnector1">
+            <a:avLst/>
+          </a:prstGeom>
+          <a:ln>
+            <a:tailEnd type="triangle"/>
+          </a:ln>
+        </p:spPr>
+        <p:style>
+          <a:lnRef idx="1">
+            <a:schemeClr val="accent1"/>
+          </a:lnRef>
+          <a:fillRef idx="0">
+            <a:schemeClr val="accent1"/>
+          </a:fillRef>
+          <a:effectRef idx="0">
+            <a:schemeClr val="accent1"/>
+          </a:effectRef>
+          <a:fontRef idx="minor">
+            <a:schemeClr val="tx1"/>
+          </a:fontRef>
+        </p:style>
+      </p:cxnSp>
+      <p:cxnSp>
+        <p:nvCxnSpPr>
+          <p:cNvPr id="72" name="Connecteur droit avec flèche 71">
+            <a:extLst>
+              <a:ext uri="{FF2B5EF4-FFF2-40B4-BE49-F238E27FC236}">
+                <a16:creationId xmlns:a16="http://schemas.microsoft.com/office/drawing/2014/main" id="{DEC410BC-D7CC-4A14-88D2-7579993863BC}"/>
+              </a:ext>
+            </a:extLst>
+          </p:cNvPr>
+          <p:cNvCxnSpPr>
+            <a:cxnSpLocks/>
+          </p:cNvCxnSpPr>
+          <p:nvPr/>
+        </p:nvCxnSpPr>
+        <p:spPr>
+          <a:xfrm flipH="1">
+            <a:off x="1384449" y="5346098"/>
+            <a:ext cx="101619" cy="330952"/>
+          </a:xfrm>
+          <a:prstGeom prst="straightConnector1">
+            <a:avLst/>
+          </a:prstGeom>
+          <a:ln>
+            <a:tailEnd type="triangle"/>
+          </a:ln>
+        </p:spPr>
+        <p:style>
+          <a:lnRef idx="1">
+            <a:schemeClr val="accent1"/>
+          </a:lnRef>
+          <a:fillRef idx="0">
+            <a:schemeClr val="accent1"/>
+          </a:fillRef>
+          <a:effectRef idx="0">
+            <a:schemeClr val="accent1"/>
+          </a:effectRef>
+          <a:fontRef idx="minor">
+            <a:schemeClr val="tx1"/>
+          </a:fontRef>
+        </p:style>
+      </p:cxnSp>
+      <p:cxnSp>
+        <p:nvCxnSpPr>
+          <p:cNvPr id="73" name="Connecteur droit avec flèche 72">
+            <a:extLst>
+              <a:ext uri="{FF2B5EF4-FFF2-40B4-BE49-F238E27FC236}">
+                <a16:creationId xmlns:a16="http://schemas.microsoft.com/office/drawing/2014/main" id="{E4554E80-BA56-46D8-8856-EEBF32D6AA1A}"/>
+              </a:ext>
+            </a:extLst>
+          </p:cNvPr>
+          <p:cNvCxnSpPr>
+            <a:cxnSpLocks/>
+          </p:cNvCxnSpPr>
+          <p:nvPr/>
+        </p:nvCxnSpPr>
+        <p:spPr>
+          <a:xfrm flipH="1">
+            <a:off x="2316426" y="5326389"/>
+            <a:ext cx="101619" cy="330952"/>
+          </a:xfrm>
+          <a:prstGeom prst="straightConnector1">
+            <a:avLst/>
+          </a:prstGeom>
+          <a:ln>
+            <a:tailEnd type="triangle"/>
+          </a:ln>
+        </p:spPr>
+        <p:style>
+          <a:lnRef idx="1">
+            <a:schemeClr val="accent1"/>
+          </a:lnRef>
+          <a:fillRef idx="0">
+            <a:schemeClr val="accent1"/>
+          </a:fillRef>
+          <a:effectRef idx="0">
+            <a:schemeClr val="accent1"/>
+          </a:effectRef>
+          <a:fontRef idx="minor">
+            <a:schemeClr val="tx1"/>
+          </a:fontRef>
+        </p:style>
+      </p:cxnSp>
+      <p:sp>
+        <p:nvSpPr>
+          <p:cNvPr id="74" name="Rectangle 73">
+            <a:extLst>
+              <a:ext uri="{FF2B5EF4-FFF2-40B4-BE49-F238E27FC236}">
+                <a16:creationId xmlns:a16="http://schemas.microsoft.com/office/drawing/2014/main" id="{4C72205A-D639-41F9-A077-C13C200812A2}"/>
+              </a:ext>
+            </a:extLst>
+          </p:cNvPr>
+          <p:cNvSpPr/>
+          <p:nvPr/>
+        </p:nvSpPr>
+        <p:spPr>
+          <a:xfrm>
+            <a:off x="903918" y="5633739"/>
+            <a:ext cx="2126810" cy="523220"/>
+          </a:xfrm>
+          <a:prstGeom prst="rect">
+            <a:avLst/>
+          </a:prstGeom>
+        </p:spPr>
+        <p:txBody>
+          <a:bodyPr wrap="square">
+            <a:spAutoFit/>
+          </a:bodyPr>
+          <a:lstStyle/>
+          <a:p>
+            <a:r>
+              <a:rPr lang="en-US" sz="1400" i="1" dirty="0">
+                <a:solidFill>
+                  <a:srgbClr val="4472C4"/>
+                </a:solidFill>
+              </a:rPr>
+              <a:t>Actual precursor m/z and RT detected </a:t>
+            </a:r>
+            <a:endParaRPr lang="en-US" sz="1400" dirty="0"/>
+          </a:p>
+        </p:txBody>
+      </p:sp>
+      <p:cxnSp>
+        <p:nvCxnSpPr>
+          <p:cNvPr id="75" name="Connecteur droit avec flèche 74">
+            <a:extLst>
+              <a:ext uri="{FF2B5EF4-FFF2-40B4-BE49-F238E27FC236}">
+                <a16:creationId xmlns:a16="http://schemas.microsoft.com/office/drawing/2014/main" id="{B9A67A2E-45B3-46DF-997C-8966C6E39396}"/>
+              </a:ext>
+            </a:extLst>
+          </p:cNvPr>
+          <p:cNvCxnSpPr>
+            <a:cxnSpLocks/>
+          </p:cNvCxnSpPr>
+          <p:nvPr/>
+        </p:nvCxnSpPr>
+        <p:spPr>
+          <a:xfrm flipH="1">
+            <a:off x="10115589" y="5374811"/>
+            <a:ext cx="234549" cy="520538"/>
+          </a:xfrm>
+          <a:prstGeom prst="straightConnector1">
+            <a:avLst/>
+          </a:prstGeom>
+          <a:ln>
+            <a:tailEnd type="triangle"/>
+          </a:ln>
+        </p:spPr>
+        <p:style>
+          <a:lnRef idx="1">
+            <a:schemeClr val="accent1"/>
+          </a:lnRef>
+          <a:fillRef idx="0">
+            <a:schemeClr val="accent1"/>
+          </a:fillRef>
+          <a:effectRef idx="0">
+            <a:schemeClr val="accent1"/>
+          </a:effectRef>
+          <a:fontRef idx="minor">
+            <a:schemeClr val="tx1"/>
+          </a:fontRef>
+        </p:style>
+      </p:cxnSp>
+      <p:sp>
+        <p:nvSpPr>
+          <p:cNvPr id="77" name="Rectangle 76">
+            <a:extLst>
+              <a:ext uri="{FF2B5EF4-FFF2-40B4-BE49-F238E27FC236}">
+                <a16:creationId xmlns:a16="http://schemas.microsoft.com/office/drawing/2014/main" id="{1944864F-589C-4147-8613-82D426846E27}"/>
+              </a:ext>
+            </a:extLst>
+          </p:cNvPr>
+          <p:cNvSpPr/>
+          <p:nvPr/>
+        </p:nvSpPr>
+        <p:spPr>
+          <a:xfrm>
+            <a:off x="8439961" y="5849182"/>
+            <a:ext cx="2087174" cy="307777"/>
+          </a:xfrm>
+          <a:prstGeom prst="rect">
+            <a:avLst/>
+          </a:prstGeom>
+        </p:spPr>
+        <p:txBody>
+          <a:bodyPr wrap="none">
+            <a:spAutoFit/>
+          </a:bodyPr>
+          <a:lstStyle/>
+          <a:p>
+            <a:r>
+              <a:rPr lang="en-US" sz="1400" i="1" dirty="0">
+                <a:solidFill>
+                  <a:srgbClr val="4472C4"/>
+                </a:solidFill>
+              </a:rPr>
+              <a:t>Unique identifier for scans</a:t>
+            </a:r>
+            <a:endParaRPr lang="en-US" sz="1400" dirty="0"/>
+          </a:p>
+        </p:txBody>
+      </p:sp>
+      <p:sp>
+        <p:nvSpPr>
+          <p:cNvPr id="79" name="ZoneTexte 78">
+            <a:extLst>
+              <a:ext uri="{FF2B5EF4-FFF2-40B4-BE49-F238E27FC236}">
+                <a16:creationId xmlns:a16="http://schemas.microsoft.com/office/drawing/2014/main" id="{63F65DBA-5478-415D-B276-68098B27D55C}"/>
+              </a:ext>
+            </a:extLst>
+          </p:cNvPr>
+          <p:cNvSpPr txBox="1"/>
+          <p:nvPr/>
+        </p:nvSpPr>
+        <p:spPr>
+          <a:xfrm>
+            <a:off x="972384" y="6246024"/>
+            <a:ext cx="9733536" cy="523220"/>
+          </a:xfrm>
+          <a:prstGeom prst="rect">
+            <a:avLst/>
+          </a:prstGeom>
+          <a:noFill/>
+        </p:spPr>
+        <p:txBody>
+          <a:bodyPr wrap="square" rtlCol="0">
+            <a:spAutoFit/>
+          </a:bodyPr>
+          <a:lstStyle/>
+          <a:p>
+            <a:r>
+              <a:rPr lang="en-US" sz="1400" i="1" u="sng" dirty="0"/>
+              <a:t>FILENAME</a:t>
+            </a:r>
+            <a:r>
+              <a:rPr lang="en-US" sz="1400" i="1" dirty="0"/>
+              <a:t> from which file the metabolic feature is detected; </a:t>
+            </a:r>
+            <a:r>
+              <a:rPr lang="en-US" sz="1400" i="1" u="sng" dirty="0"/>
+              <a:t>PEPMASS_DEV </a:t>
+            </a:r>
+            <a:r>
+              <a:rPr lang="en-US" sz="1400" i="1" dirty="0"/>
+              <a:t>Mass deviation (ppm) of precursor m/z to what is in user-provided targeted m/z; </a:t>
+            </a:r>
+            <a:r>
+              <a:rPr lang="en-US" sz="1400" i="1" u="sng" dirty="0"/>
+              <a:t>SCAN_NUMBER</a:t>
+            </a:r>
+            <a:r>
+              <a:rPr lang="en-US" sz="1400" dirty="0"/>
+              <a:t> </a:t>
+            </a:r>
+            <a:r>
+              <a:rPr lang="en-US" sz="1400" i="1" dirty="0"/>
+              <a:t>scan number in original LC-MS/MS chromatogram</a:t>
+            </a:r>
+          </a:p>
+        </p:txBody>
+      </p:sp>
+    </p:spTree>
+    <p:extLst>
+      <p:ext uri="{BB962C8B-B14F-4D97-AF65-F5344CB8AC3E}">
+        <p14:creationId xmlns:p14="http://schemas.microsoft.com/office/powerpoint/2010/main" val="1776500879"/>
+      </p:ext>
+    </p:extLst>
+  </p:cSld>
+  <p:clrMapOvr>
+    <a:masterClrMapping/>
+  </p:clrMapOvr>
+</p:sld>
+</file>
+
+<file path=ppt/slides/slide7.xml><?xml version="1.0" encoding="utf-8"?>
+<p:sld xmlns:a="http://schemas.openxmlformats.org/drawingml/2006/main" xmlns:r="http://schemas.openxmlformats.org/officeDocument/2006/relationships" xmlns:p="http://schemas.openxmlformats.org/presentationml/2006/main">
+  <p:cSld>
+    <p:spTree>
+      <p:nvGrpSpPr>
+        <p:cNvPr id="1" name=""/>
+        <p:cNvGrpSpPr/>
+        <p:nvPr/>
+      </p:nvGrpSpPr>
+      <p:grpSpPr>
+        <a:xfrm>
+          <a:off x="0" y="0"/>
+          <a:ext cx="0" cy="0"/>
+          <a:chOff x="0" y="0"/>
+          <a:chExt cx="0" cy="0"/>
+        </a:xfrm>
+      </p:grpSpPr>
+      <p:sp>
+        <p:nvSpPr>
+          <p:cNvPr id="34" name="Rectangle 33">
+            <a:extLst>
+              <a:ext uri="{FF2B5EF4-FFF2-40B4-BE49-F238E27FC236}">
+                <a16:creationId xmlns:a16="http://schemas.microsoft.com/office/drawing/2014/main" id="{3B7AB05D-59C0-412F-90BA-E7538D3CFD01}"/>
+              </a:ext>
+            </a:extLst>
+          </p:cNvPr>
+          <p:cNvSpPr/>
+          <p:nvPr/>
+        </p:nvSpPr>
+        <p:spPr>
+          <a:xfrm>
+            <a:off x="1218607" y="-499516"/>
+            <a:ext cx="7925393" cy="8243397"/>
+          </a:xfrm>
+          <a:prstGeom prst="rect">
+            <a:avLst/>
+          </a:prstGeom>
+          <a:solidFill>
+            <a:schemeClr val="bg1"/>
+          </a:solidFill>
+          <a:ln>
+            <a:solidFill>
+              <a:schemeClr val="bg1"/>
+            </a:solidFill>
+          </a:ln>
+        </p:spPr>
+        <p:style>
+          <a:lnRef idx="2">
+            <a:schemeClr val="accent1">
+              <a:shade val="50000"/>
+            </a:schemeClr>
+          </a:lnRef>
+          <a:fillRef idx="1">
+            <a:schemeClr val="accent1"/>
+          </a:fillRef>
+          <a:effectRef idx="0">
+            <a:schemeClr val="accent1"/>
+          </a:effectRef>
+          <a:fontRef idx="minor">
+            <a:schemeClr val="lt1"/>
+          </a:fontRef>
+        </p:style>
+        <p:txBody>
+          <a:bodyPr rtlCol="0" anchor="ctr"/>
+          <a:lstStyle/>
+          <a:p>
+            <a:pPr algn="ctr"/>
+            <a:endParaRPr lang="en-US"/>
+          </a:p>
+        </p:txBody>
+      </p:sp>
+      <p:pic>
+        <p:nvPicPr>
+          <p:cNvPr id="33" name="Image 32">
+            <a:extLst>
+              <a:ext uri="{FF2B5EF4-FFF2-40B4-BE49-F238E27FC236}">
+                <a16:creationId xmlns:a16="http://schemas.microsoft.com/office/drawing/2014/main" id="{6BC6C590-3C4D-4BF7-AE37-FEC61D14AFDD}"/>
+              </a:ext>
+            </a:extLst>
+          </p:cNvPr>
+          <p:cNvPicPr>
+            <a:picLocks noChangeAspect="1"/>
+          </p:cNvPicPr>
+          <p:nvPr/>
+        </p:nvPicPr>
+        <p:blipFill rotWithShape="1">
+          <a:blip r:embed="rId2"/>
+          <a:srcRect l="-42" t="15061" r="4943" b="3228"/>
+          <a:stretch/>
+        </p:blipFill>
+        <p:spPr>
+          <a:xfrm>
+            <a:off x="5185356" y="4960460"/>
+            <a:ext cx="3868994" cy="2783422"/>
+          </a:xfrm>
+          <a:prstGeom prst="rect">
+            <a:avLst/>
+          </a:prstGeom>
+        </p:spPr>
+      </p:pic>
+      <p:pic>
+        <p:nvPicPr>
+          <p:cNvPr id="30" name="Image 29">
+            <a:extLst>
+              <a:ext uri="{FF2B5EF4-FFF2-40B4-BE49-F238E27FC236}">
+                <a16:creationId xmlns:a16="http://schemas.microsoft.com/office/drawing/2014/main" id="{91424227-A9ED-4F4B-95F7-D09430553147}"/>
+              </a:ext>
+            </a:extLst>
+          </p:cNvPr>
+          <p:cNvPicPr>
+            <a:picLocks noChangeAspect="1"/>
+          </p:cNvPicPr>
+          <p:nvPr/>
+        </p:nvPicPr>
+        <p:blipFill rotWithShape="1">
+          <a:blip r:embed="rId3"/>
+          <a:srcRect t="16311" r="4943" b="3973"/>
+          <a:stretch/>
+        </p:blipFill>
+        <p:spPr>
+          <a:xfrm>
+            <a:off x="1124338" y="5028391"/>
+            <a:ext cx="3795848" cy="2715491"/>
+          </a:xfrm>
+          <a:prstGeom prst="rect">
+            <a:avLst/>
+          </a:prstGeom>
+        </p:spPr>
+      </p:pic>
+      <p:pic>
+        <p:nvPicPr>
+          <p:cNvPr id="9" name="Image 8">
+            <a:extLst>
+              <a:ext uri="{FF2B5EF4-FFF2-40B4-BE49-F238E27FC236}">
+                <a16:creationId xmlns:a16="http://schemas.microsoft.com/office/drawing/2014/main" id="{7FF607F5-4536-41E1-8F17-0AADF1912EBB}"/>
+              </a:ext>
+            </a:extLst>
+          </p:cNvPr>
+          <p:cNvPicPr>
+            <a:picLocks noChangeAspect="1"/>
+          </p:cNvPicPr>
+          <p:nvPr/>
+        </p:nvPicPr>
+        <p:blipFill rotWithShape="1">
+          <a:blip r:embed="rId4"/>
+          <a:srcRect l="270" t="14859" r="4673" b="3431"/>
+          <a:stretch/>
+        </p:blipFill>
+        <p:spPr>
+          <a:xfrm>
+            <a:off x="1124338" y="2175697"/>
+            <a:ext cx="3795848" cy="2783422"/>
+          </a:xfrm>
+          <a:prstGeom prst="rect">
+            <a:avLst/>
+          </a:prstGeom>
+        </p:spPr>
+      </p:pic>
+      <p:pic>
+        <p:nvPicPr>
+          <p:cNvPr id="10" name="Image 9">
+            <a:extLst>
+              <a:ext uri="{FF2B5EF4-FFF2-40B4-BE49-F238E27FC236}">
+                <a16:creationId xmlns:a16="http://schemas.microsoft.com/office/drawing/2014/main" id="{02B07046-2F77-41E5-8746-54300A70DE51}"/>
+              </a:ext>
+            </a:extLst>
+          </p:cNvPr>
+          <p:cNvPicPr>
+            <a:picLocks noChangeAspect="1"/>
+          </p:cNvPicPr>
+          <p:nvPr/>
+        </p:nvPicPr>
+        <p:blipFill rotWithShape="1">
+          <a:blip r:embed="rId5"/>
+          <a:srcRect t="16012" r="4943" b="2277"/>
+          <a:stretch/>
+        </p:blipFill>
+        <p:spPr>
+          <a:xfrm>
+            <a:off x="5185356" y="2175697"/>
+            <a:ext cx="3795848" cy="2783423"/>
+          </a:xfrm>
+          <a:prstGeom prst="rect">
+            <a:avLst/>
+          </a:prstGeom>
+        </p:spPr>
+      </p:pic>
+      <p:sp>
+        <p:nvSpPr>
+          <p:cNvPr id="26" name="ZoneTexte 25">
+            <a:extLst>
+              <a:ext uri="{FF2B5EF4-FFF2-40B4-BE49-F238E27FC236}">
+                <a16:creationId xmlns:a16="http://schemas.microsoft.com/office/drawing/2014/main" id="{38FC39F2-AC53-43FC-A9EA-0B6ADE43FB49}"/>
+              </a:ext>
+            </a:extLst>
+          </p:cNvPr>
+          <p:cNvSpPr txBox="1"/>
+          <p:nvPr/>
+        </p:nvSpPr>
+        <p:spPr>
+          <a:xfrm>
+            <a:off x="3711708" y="2339048"/>
+            <a:ext cx="1274618" cy="461665"/>
+          </a:xfrm>
+          <a:prstGeom prst="rect">
+            <a:avLst/>
+          </a:prstGeom>
+          <a:noFill/>
+        </p:spPr>
+        <p:txBody>
+          <a:bodyPr wrap="square" rtlCol="0">
+            <a:spAutoFit/>
+          </a:bodyPr>
+          <a:lstStyle/>
+          <a:p>
+            <a:r>
+              <a:rPr lang="en-US" sz="2400" dirty="0"/>
+              <a:t>library2</a:t>
+            </a:r>
+          </a:p>
+        </p:txBody>
+      </p:sp>
+      <p:sp>
+        <p:nvSpPr>
+          <p:cNvPr id="27" name="ZoneTexte 26">
+            <a:extLst>
+              <a:ext uri="{FF2B5EF4-FFF2-40B4-BE49-F238E27FC236}">
+                <a16:creationId xmlns:a16="http://schemas.microsoft.com/office/drawing/2014/main" id="{96C33D78-97FC-47EB-9318-DD83E991AE95}"/>
+              </a:ext>
+            </a:extLst>
+          </p:cNvPr>
+          <p:cNvSpPr txBox="1"/>
+          <p:nvPr/>
+        </p:nvSpPr>
+        <p:spPr>
+          <a:xfrm>
+            <a:off x="3425380" y="5122470"/>
+            <a:ext cx="1560946" cy="461665"/>
+          </a:xfrm>
+          <a:prstGeom prst="rect">
+            <a:avLst/>
+          </a:prstGeom>
+          <a:noFill/>
+        </p:spPr>
+        <p:txBody>
+          <a:bodyPr wrap="square" rtlCol="0">
+            <a:spAutoFit/>
+          </a:bodyPr>
+          <a:lstStyle/>
+          <a:p>
+            <a:r>
+              <a:rPr lang="en-US" sz="2400" dirty="0"/>
+              <a:t>library2_2</a:t>
+            </a:r>
+          </a:p>
+        </p:txBody>
+      </p:sp>
+      <p:sp>
+        <p:nvSpPr>
+          <p:cNvPr id="28" name="ZoneTexte 27">
+            <a:extLst>
+              <a:ext uri="{FF2B5EF4-FFF2-40B4-BE49-F238E27FC236}">
+                <a16:creationId xmlns:a16="http://schemas.microsoft.com/office/drawing/2014/main" id="{B0A378D1-7C62-4F52-842B-867B8630D4BF}"/>
+              </a:ext>
+            </a:extLst>
+          </p:cNvPr>
+          <p:cNvSpPr txBox="1"/>
+          <p:nvPr/>
+        </p:nvSpPr>
+        <p:spPr>
+          <a:xfrm>
+            <a:off x="7493404" y="5122469"/>
+            <a:ext cx="1560946" cy="461665"/>
+          </a:xfrm>
+          <a:prstGeom prst="rect">
+            <a:avLst/>
+          </a:prstGeom>
+          <a:noFill/>
+        </p:spPr>
+        <p:txBody>
+          <a:bodyPr wrap="square" rtlCol="0">
+            <a:spAutoFit/>
+          </a:bodyPr>
+          <a:lstStyle/>
+          <a:p>
+            <a:r>
+              <a:rPr lang="en-US" sz="2400" dirty="0"/>
+              <a:t>library2_3</a:t>
+            </a:r>
+          </a:p>
+        </p:txBody>
+      </p:sp>
+      <p:sp>
+        <p:nvSpPr>
+          <p:cNvPr id="29" name="ZoneTexte 28">
+            <a:extLst>
+              <a:ext uri="{FF2B5EF4-FFF2-40B4-BE49-F238E27FC236}">
+                <a16:creationId xmlns:a16="http://schemas.microsoft.com/office/drawing/2014/main" id="{79D3C1F9-0E01-4D46-A14C-5F9DB99A6FD7}"/>
+              </a:ext>
+            </a:extLst>
+          </p:cNvPr>
+          <p:cNvSpPr txBox="1"/>
+          <p:nvPr/>
+        </p:nvSpPr>
+        <p:spPr>
+          <a:xfrm>
+            <a:off x="7779732" y="2339047"/>
+            <a:ext cx="1274618" cy="461665"/>
+          </a:xfrm>
+          <a:prstGeom prst="rect">
+            <a:avLst/>
+          </a:prstGeom>
+          <a:noFill/>
+        </p:spPr>
+        <p:txBody>
+          <a:bodyPr wrap="square" rtlCol="0">
+            <a:spAutoFit/>
+          </a:bodyPr>
+          <a:lstStyle/>
+          <a:p>
+            <a:r>
+              <a:rPr lang="en-US" sz="2400" dirty="0"/>
+              <a:t>library2</a:t>
+            </a:r>
+          </a:p>
+        </p:txBody>
+      </p:sp>
+      <p:pic>
+        <p:nvPicPr>
+          <p:cNvPr id="2" name="Image 1">
+            <a:extLst>
+              <a:ext uri="{FF2B5EF4-FFF2-40B4-BE49-F238E27FC236}">
+                <a16:creationId xmlns:a16="http://schemas.microsoft.com/office/drawing/2014/main" id="{186DB5B5-172D-42E7-BA5D-0C05854EA059}"/>
+              </a:ext>
+            </a:extLst>
+          </p:cNvPr>
+          <p:cNvPicPr>
+            <a:picLocks noChangeAspect="1"/>
+          </p:cNvPicPr>
+          <p:nvPr/>
+        </p:nvPicPr>
+        <p:blipFill rotWithShape="1">
+          <a:blip r:embed="rId6"/>
+          <a:srcRect t="15765" r="6001" b="4161"/>
+          <a:stretch/>
+        </p:blipFill>
+        <p:spPr>
+          <a:xfrm>
+            <a:off x="1124338" y="-430244"/>
+            <a:ext cx="3715518" cy="2700020"/>
+          </a:xfrm>
+          <a:prstGeom prst="rect">
+            <a:avLst/>
+          </a:prstGeom>
+        </p:spPr>
+      </p:pic>
+      <p:sp>
+        <p:nvSpPr>
+          <p:cNvPr id="4" name="ZoneTexte 3">
+            <a:extLst>
+              <a:ext uri="{FF2B5EF4-FFF2-40B4-BE49-F238E27FC236}">
+                <a16:creationId xmlns:a16="http://schemas.microsoft.com/office/drawing/2014/main" id="{A08FBF4A-6C3B-47AC-8DF6-2BE24A31EFE4}"/>
+              </a:ext>
+            </a:extLst>
+          </p:cNvPr>
+          <p:cNvSpPr txBox="1"/>
+          <p:nvPr/>
+        </p:nvSpPr>
+        <p:spPr>
+          <a:xfrm>
+            <a:off x="5780580" y="0"/>
+            <a:ext cx="2789382" cy="1200329"/>
+          </a:xfrm>
+          <a:prstGeom prst="rect">
+            <a:avLst/>
+          </a:prstGeom>
+          <a:noFill/>
+        </p:spPr>
+        <p:txBody>
+          <a:bodyPr wrap="square" rtlCol="0">
+            <a:spAutoFit/>
+          </a:bodyPr>
+          <a:lstStyle/>
+          <a:p>
+            <a:r>
+              <a:rPr lang="en-US" b="1" dirty="0"/>
+              <a:t>ID = 28</a:t>
+            </a:r>
+          </a:p>
+          <a:p>
+            <a:r>
+              <a:rPr lang="en-US" dirty="0"/>
+              <a:t>MS1 scan is the same in library2, library2_2 or library2_3 !</a:t>
+            </a:r>
+          </a:p>
+        </p:txBody>
+      </p:sp>
+      <p:cxnSp>
+        <p:nvCxnSpPr>
+          <p:cNvPr id="6" name="Connecteur droit avec flèche 5">
+            <a:extLst>
+              <a:ext uri="{FF2B5EF4-FFF2-40B4-BE49-F238E27FC236}">
+                <a16:creationId xmlns:a16="http://schemas.microsoft.com/office/drawing/2014/main" id="{DD00EF1A-A687-406F-84C2-7118F3750FCA}"/>
+              </a:ext>
+            </a:extLst>
+          </p:cNvPr>
+          <p:cNvCxnSpPr>
+            <a:stCxn id="4" idx="1"/>
+          </p:cNvCxnSpPr>
+          <p:nvPr/>
+        </p:nvCxnSpPr>
+        <p:spPr>
+          <a:xfrm flipH="1" flipV="1">
+            <a:off x="4404435" y="600164"/>
+            <a:ext cx="1376145" cy="1"/>
+          </a:xfrm>
+          <a:prstGeom prst="straightConnector1">
+            <a:avLst/>
+          </a:prstGeom>
+          <a:ln w="19050">
+            <a:solidFill>
+              <a:srgbClr val="FF0000"/>
+            </a:solidFill>
+            <a:tailEnd type="triangle"/>
+          </a:ln>
+        </p:spPr>
+        <p:style>
+          <a:lnRef idx="1">
+            <a:schemeClr val="accent1"/>
+          </a:lnRef>
+          <a:fillRef idx="0">
+            <a:schemeClr val="accent1"/>
+          </a:fillRef>
+          <a:effectRef idx="0">
+            <a:schemeClr val="accent1"/>
+          </a:effectRef>
+          <a:fontRef idx="minor">
+            <a:schemeClr val="tx1"/>
+          </a:fontRef>
+        </p:style>
+      </p:cxnSp>
+    </p:spTree>
+    <p:extLst>
+      <p:ext uri="{BB962C8B-B14F-4D97-AF65-F5344CB8AC3E}">
+        <p14:creationId xmlns:p14="http://schemas.microsoft.com/office/powerpoint/2010/main" val="444585465"/>
+      </p:ext>
+    </p:extLst>
+  </p:cSld>
+  <p:clrMapOvr>
+    <a:masterClrMapping/>
+  </p:clrMapOvr>
+</p:sld>
+</file>
+
 <file path=ppt/theme/theme1.xml><?xml version="1.0" encoding="utf-8"?>
 <a:theme xmlns:a="http://schemas.openxmlformats.org/drawingml/2006/main" name="Thème Office">
   <a:themeElements>

</xml_diff>

<commit_message>
add visualize and search library,update tutorial
</commit_message>
<xml_diff>
--- a/inst/tmp.pptx
+++ b/inst/tmp.pptx
@@ -12,6 +12,7 @@
     <p:sldId id="260" r:id="rId6"/>
     <p:sldId id="261" r:id="rId7"/>
     <p:sldId id="262" r:id="rId8"/>
+    <p:sldId id="263" r:id="rId9"/>
   </p:sldIdLst>
   <p:sldSz cx="12192000" cy="6858000"/>
   <p:notesSz cx="6858000" cy="9144000"/>
@@ -267,7 +268,7 @@
           <a:p>
             <a:fld id="{63C097CE-CE30-40FD-8349-F85D75ED7B0A}" type="datetimeFigureOut">
               <a:rPr lang="en-US" smtClean="0"/>
-              <a:t>8/9/2018</a:t>
+              <a:t>8/16/2018</a:t>
             </a:fld>
             <a:endParaRPr lang="en-US"/>
           </a:p>
@@ -467,7 +468,7 @@
           <a:p>
             <a:fld id="{63C097CE-CE30-40FD-8349-F85D75ED7B0A}" type="datetimeFigureOut">
               <a:rPr lang="en-US" smtClean="0"/>
-              <a:t>8/9/2018</a:t>
+              <a:t>8/16/2018</a:t>
             </a:fld>
             <a:endParaRPr lang="en-US"/>
           </a:p>
@@ -677,7 +678,7 @@
           <a:p>
             <a:fld id="{63C097CE-CE30-40FD-8349-F85D75ED7B0A}" type="datetimeFigureOut">
               <a:rPr lang="en-US" smtClean="0"/>
-              <a:t>8/9/2018</a:t>
+              <a:t>8/16/2018</a:t>
             </a:fld>
             <a:endParaRPr lang="en-US"/>
           </a:p>
@@ -877,7 +878,7 @@
           <a:p>
             <a:fld id="{63C097CE-CE30-40FD-8349-F85D75ED7B0A}" type="datetimeFigureOut">
               <a:rPr lang="en-US" smtClean="0"/>
-              <a:t>8/9/2018</a:t>
+              <a:t>8/16/2018</a:t>
             </a:fld>
             <a:endParaRPr lang="en-US"/>
           </a:p>
@@ -1153,7 +1154,7 @@
           <a:p>
             <a:fld id="{63C097CE-CE30-40FD-8349-F85D75ED7B0A}" type="datetimeFigureOut">
               <a:rPr lang="en-US" smtClean="0"/>
-              <a:t>8/9/2018</a:t>
+              <a:t>8/16/2018</a:t>
             </a:fld>
             <a:endParaRPr lang="en-US"/>
           </a:p>
@@ -1421,7 +1422,7 @@
           <a:p>
             <a:fld id="{63C097CE-CE30-40FD-8349-F85D75ED7B0A}" type="datetimeFigureOut">
               <a:rPr lang="en-US" smtClean="0"/>
-              <a:t>8/9/2018</a:t>
+              <a:t>8/16/2018</a:t>
             </a:fld>
             <a:endParaRPr lang="en-US"/>
           </a:p>
@@ -1836,7 +1837,7 @@
           <a:p>
             <a:fld id="{63C097CE-CE30-40FD-8349-F85D75ED7B0A}" type="datetimeFigureOut">
               <a:rPr lang="en-US" smtClean="0"/>
-              <a:t>8/9/2018</a:t>
+              <a:t>8/16/2018</a:t>
             </a:fld>
             <a:endParaRPr lang="en-US"/>
           </a:p>
@@ -1978,7 +1979,7 @@
           <a:p>
             <a:fld id="{63C097CE-CE30-40FD-8349-F85D75ED7B0A}" type="datetimeFigureOut">
               <a:rPr lang="en-US" smtClean="0"/>
-              <a:t>8/9/2018</a:t>
+              <a:t>8/16/2018</a:t>
             </a:fld>
             <a:endParaRPr lang="en-US"/>
           </a:p>
@@ -2091,7 +2092,7 @@
           <a:p>
             <a:fld id="{63C097CE-CE30-40FD-8349-F85D75ED7B0A}" type="datetimeFigureOut">
               <a:rPr lang="en-US" smtClean="0"/>
-              <a:t>8/9/2018</a:t>
+              <a:t>8/16/2018</a:t>
             </a:fld>
             <a:endParaRPr lang="en-US"/>
           </a:p>
@@ -2404,7 +2405,7 @@
           <a:p>
             <a:fld id="{63C097CE-CE30-40FD-8349-F85D75ED7B0A}" type="datetimeFigureOut">
               <a:rPr lang="en-US" smtClean="0"/>
-              <a:t>8/9/2018</a:t>
+              <a:t>8/16/2018</a:t>
             </a:fld>
             <a:endParaRPr lang="en-US"/>
           </a:p>
@@ -2693,7 +2694,7 @@
           <a:p>
             <a:fld id="{63C097CE-CE30-40FD-8349-F85D75ED7B0A}" type="datetimeFigureOut">
               <a:rPr lang="en-US" smtClean="0"/>
-              <a:t>8/9/2018</a:t>
+              <a:t>8/16/2018</a:t>
             </a:fld>
             <a:endParaRPr lang="en-US"/>
           </a:p>
@@ -2936,7 +2937,7 @@
           <a:p>
             <a:fld id="{63C097CE-CE30-40FD-8349-F85D75ED7B0A}" type="datetimeFigureOut">
               <a:rPr lang="en-US" smtClean="0"/>
-              <a:t>8/9/2018</a:t>
+              <a:t>8/16/2018</a:t>
             </a:fld>
             <a:endParaRPr lang="en-US"/>
           </a:p>
@@ -3367,8 +3368,8 @@
         </p:nvSpPr>
         <p:spPr>
           <a:xfrm>
-            <a:off x="-828982" y="454792"/>
-            <a:ext cx="13214945" cy="6403208"/>
+            <a:off x="-899630" y="461054"/>
+            <a:ext cx="13861491" cy="5511648"/>
           </a:xfrm>
           <a:prstGeom prst="rect">
             <a:avLst/>
@@ -3429,7 +3430,7 @@
         </p:blipFill>
         <p:spPr>
           <a:xfrm>
-            <a:off x="1685028" y="3310856"/>
+            <a:off x="1564396" y="726851"/>
             <a:ext cx="1873502" cy="1236749"/>
           </a:xfrm>
           <a:prstGeom prst="rect">
@@ -3902,7 +3903,7 @@
         </p:nvSpPr>
         <p:spPr>
           <a:xfrm>
-            <a:off x="-151709" y="5561440"/>
+            <a:off x="-135905" y="4614728"/>
             <a:ext cx="1392658" cy="707886"/>
           </a:xfrm>
           <a:prstGeom prst="rect">
@@ -3970,8 +3971,8 @@
         </p:nvSpPr>
         <p:spPr>
           <a:xfrm>
-            <a:off x="1260509" y="5469019"/>
-            <a:ext cx="294207" cy="934189"/>
+            <a:off x="1318978" y="4343130"/>
+            <a:ext cx="316618" cy="1236344"/>
           </a:xfrm>
           <a:prstGeom prst="leftBrace">
             <a:avLst>
@@ -4022,8 +4023,8 @@
         </p:nvSpPr>
         <p:spPr>
           <a:xfrm>
-            <a:off x="1631892" y="5339433"/>
-            <a:ext cx="2435660" cy="1200329"/>
+            <a:off x="1662250" y="4241286"/>
+            <a:ext cx="2435660" cy="1754326"/>
           </a:xfrm>
           <a:prstGeom prst="rect">
             <a:avLst/>
@@ -4114,14 +4115,161 @@
               <a:t>Ion mode</a:t>
             </a:r>
           </a:p>
-        </p:txBody>
-      </p:sp>
-      <p:sp>
-        <p:nvSpPr>
-          <p:cNvPr id="59" name="Rectangle : coins arrondis 58">
-            <a:extLst>
-              <a:ext uri="{FF2B5EF4-FFF2-40B4-BE49-F238E27FC236}">
-                <a16:creationId xmlns:a16="http://schemas.microsoft.com/office/drawing/2014/main" id="{8AA0A447-4A95-409F-9519-894B8A17BD10}"/>
+          <a:p>
+            <a:pPr lvl="0" eaLnBrk="0" fontAlgn="base" hangingPunct="0">
+              <a:spcBef>
+                <a:spcPct val="0"/>
+              </a:spcBef>
+              <a:spcAft>
+                <a:spcPct val="0"/>
+              </a:spcAft>
+            </a:pPr>
+            <a:r>
+              <a:rPr lang="en-US" altLang="en-US" dirty="0">
+                <a:solidFill>
+                  <a:srgbClr val="000000"/>
+                </a:solidFill>
+                <a:latin typeface="Calibri" panose="020F0502020204030204" pitchFamily="34" charset="0"/>
+                <a:cs typeface="Calibri" panose="020F0502020204030204" pitchFamily="34" charset="0"/>
+              </a:rPr>
+              <a:t>Adduct type</a:t>
+            </a:r>
+          </a:p>
+          <a:p>
+            <a:pPr lvl="0" eaLnBrk="0" fontAlgn="base" hangingPunct="0">
+              <a:spcBef>
+                <a:spcPct val="0"/>
+              </a:spcBef>
+              <a:spcAft>
+                <a:spcPct val="0"/>
+              </a:spcAft>
+            </a:pPr>
+            <a:r>
+              <a:rPr lang="en-US" altLang="en-US" dirty="0">
+                <a:solidFill>
+                  <a:srgbClr val="000000"/>
+                </a:solidFill>
+                <a:latin typeface="Calibri" panose="020F0502020204030204" pitchFamily="34" charset="0"/>
+                <a:cs typeface="Calibri" panose="020F0502020204030204" pitchFamily="34" charset="0"/>
+              </a:rPr>
+              <a:t>…</a:t>
+            </a:r>
+          </a:p>
+        </p:txBody>
+      </p:sp>
+      <p:pic>
+        <p:nvPicPr>
+          <p:cNvPr id="60" name="Image 59">
+            <a:extLst>
+              <a:ext uri="{FF2B5EF4-FFF2-40B4-BE49-F238E27FC236}">
+                <a16:creationId xmlns:a16="http://schemas.microsoft.com/office/drawing/2014/main" id="{912F0D45-638E-41E9-AF83-C03C8020DD5B}"/>
+              </a:ext>
+            </a:extLst>
+          </p:cNvPr>
+          <p:cNvPicPr>
+            <a:picLocks noChangeAspect="1"/>
+          </p:cNvPicPr>
+          <p:nvPr/>
+        </p:nvPicPr>
+        <p:blipFill>
+          <a:blip r:embed="rId3"/>
+          <a:stretch>
+            <a:fillRect/>
+          </a:stretch>
+        </p:blipFill>
+        <p:spPr>
+          <a:xfrm>
+            <a:off x="4979540" y="861164"/>
+            <a:ext cx="2103153" cy="1468581"/>
+          </a:xfrm>
+          <a:prstGeom prst="rect">
+            <a:avLst/>
+          </a:prstGeom>
+        </p:spPr>
+      </p:pic>
+      <p:pic>
+        <p:nvPicPr>
+          <p:cNvPr id="61" name="Image 60">
+            <a:extLst>
+              <a:ext uri="{FF2B5EF4-FFF2-40B4-BE49-F238E27FC236}">
+                <a16:creationId xmlns:a16="http://schemas.microsoft.com/office/drawing/2014/main" id="{C9E1DE31-DF15-4B98-BA7C-5CC4878701DA}"/>
+              </a:ext>
+            </a:extLst>
+          </p:cNvPr>
+          <p:cNvPicPr>
+            <a:picLocks noChangeAspect="1"/>
+          </p:cNvPicPr>
+          <p:nvPr/>
+        </p:nvPicPr>
+        <p:blipFill>
+          <a:blip r:embed="rId4"/>
+          <a:stretch>
+            <a:fillRect/>
+          </a:stretch>
+        </p:blipFill>
+        <p:spPr>
+          <a:xfrm>
+            <a:off x="4992053" y="3009360"/>
+            <a:ext cx="2151398" cy="1510376"/>
+          </a:xfrm>
+          <a:prstGeom prst="rect">
+            <a:avLst/>
+          </a:prstGeom>
+        </p:spPr>
+      </p:pic>
+      <p:sp>
+        <p:nvSpPr>
+          <p:cNvPr id="64" name="ZoneTexte 63">
+            <a:extLst>
+              <a:ext uri="{FF2B5EF4-FFF2-40B4-BE49-F238E27FC236}">
+                <a16:creationId xmlns:a16="http://schemas.microsoft.com/office/drawing/2014/main" id="{A9BCE1B9-9E04-4723-B03C-A52D9DC1806C}"/>
+              </a:ext>
+            </a:extLst>
+          </p:cNvPr>
+          <p:cNvSpPr txBox="1"/>
+          <p:nvPr/>
+        </p:nvSpPr>
+        <p:spPr>
+          <a:xfrm>
+            <a:off x="3740124" y="2595455"/>
+            <a:ext cx="2355876" cy="400110"/>
+          </a:xfrm>
+          <a:prstGeom prst="rect">
+            <a:avLst/>
+          </a:prstGeom>
+          <a:noFill/>
+        </p:spPr>
+        <p:txBody>
+          <a:bodyPr wrap="square" rtlCol="0">
+            <a:spAutoFit/>
+          </a:bodyPr>
+          <a:lstStyle/>
+          <a:p>
+            <a:r>
+              <a:rPr lang="en-US" sz="2000" i="1" dirty="0" err="1">
+                <a:solidFill>
+                  <a:srgbClr val="FF0000"/>
+                </a:solidFill>
+              </a:rPr>
+              <a:t>library_generator</a:t>
+            </a:r>
+            <a:r>
+              <a:rPr lang="en-US" sz="2000" i="1" dirty="0">
+                <a:solidFill>
+                  <a:srgbClr val="FF0000"/>
+                </a:solidFill>
+              </a:rPr>
+              <a:t> ()</a:t>
+            </a:r>
+          </a:p>
+        </p:txBody>
+      </p:sp>
+      <p:sp>
+        <p:nvSpPr>
+          <p:cNvPr id="26" name="Rectangle : coins arrondis 25">
+            <a:extLst>
+              <a:ext uri="{FF2B5EF4-FFF2-40B4-BE49-F238E27FC236}">
+                <a16:creationId xmlns:a16="http://schemas.microsoft.com/office/drawing/2014/main" id="{EA0F6D78-D54F-40E6-9D5F-C2C7E4153B1E}"/>
               </a:ext>
             </a:extLst>
           </p:cNvPr>
@@ -4130,8 +4278,8 @@
         </p:nvSpPr>
         <p:spPr>
           <a:xfrm>
-            <a:off x="7688821" y="5774379"/>
-            <a:ext cx="1382184" cy="734676"/>
+            <a:off x="10671812" y="677196"/>
+            <a:ext cx="2140722" cy="847256"/>
           </a:xfrm>
           <a:prstGeom prst="roundRect">
             <a:avLst/>
@@ -4170,117 +4318,28 @@
                   <a:schemeClr val="tx1"/>
                 </a:solidFill>
               </a:rPr>
-              <a:t>.</a:t>
-            </a:r>
-            <a:r>
-              <a:rPr lang="en-US" sz="2000" b="1" dirty="0" err="1">
+              <a:t>In-house library</a:t>
+            </a:r>
+          </a:p>
+          <a:p>
+            <a:pPr algn="ctr"/>
+            <a:r>
+              <a:rPr lang="en-US" i="1" dirty="0">
                 <a:solidFill>
                   <a:schemeClr val="tx1"/>
                 </a:solidFill>
               </a:rPr>
-              <a:t>dat</a:t>
-            </a:r>
-            <a:endParaRPr lang="en-US" sz="2000" b="1" dirty="0">
-              <a:solidFill>
-                <a:schemeClr val="tx1"/>
-              </a:solidFill>
-            </a:endParaRPr>
-          </a:p>
-          <a:p>
-            <a:pPr algn="ctr"/>
-            <a:r>
-              <a:rPr lang="en-US" sz="2000" b="1" dirty="0">
-                <a:solidFill>
-                  <a:schemeClr val="tx1"/>
-                </a:solidFill>
-              </a:rPr>
-              <a:t>(</a:t>
-            </a:r>
-            <a:r>
-              <a:rPr lang="en-US" sz="2000" b="1" dirty="0" err="1">
-                <a:solidFill>
-                  <a:schemeClr val="tx1"/>
-                </a:solidFill>
-              </a:rPr>
-              <a:t>Metfrag</a:t>
-            </a:r>
-            <a:r>
-              <a:rPr lang="en-US" sz="2000" b="1" dirty="0">
-                <a:solidFill>
-                  <a:schemeClr val="tx1"/>
-                </a:solidFill>
-              </a:rPr>
-              <a:t>)</a:t>
-            </a:r>
-          </a:p>
-        </p:txBody>
-      </p:sp>
-      <p:pic>
-        <p:nvPicPr>
-          <p:cNvPr id="60" name="Image 59">
-            <a:extLst>
-              <a:ext uri="{FF2B5EF4-FFF2-40B4-BE49-F238E27FC236}">
-                <a16:creationId xmlns:a16="http://schemas.microsoft.com/office/drawing/2014/main" id="{912F0D45-638E-41E9-AF83-C03C8020DD5B}"/>
-              </a:ext>
-            </a:extLst>
-          </p:cNvPr>
-          <p:cNvPicPr>
-            <a:picLocks noChangeAspect="1"/>
-          </p:cNvPicPr>
-          <p:nvPr/>
-        </p:nvPicPr>
-        <p:blipFill>
-          <a:blip r:embed="rId3"/>
-          <a:stretch>
-            <a:fillRect/>
-          </a:stretch>
-        </p:blipFill>
-        <p:spPr>
-          <a:xfrm>
-            <a:off x="4979540" y="861164"/>
-            <a:ext cx="2103153" cy="1468581"/>
-          </a:xfrm>
-          <a:prstGeom prst="rect">
-            <a:avLst/>
-          </a:prstGeom>
-        </p:spPr>
-      </p:pic>
-      <p:pic>
-        <p:nvPicPr>
-          <p:cNvPr id="61" name="Image 60">
-            <a:extLst>
-              <a:ext uri="{FF2B5EF4-FFF2-40B4-BE49-F238E27FC236}">
-                <a16:creationId xmlns:a16="http://schemas.microsoft.com/office/drawing/2014/main" id="{C9E1DE31-DF15-4B98-BA7C-5CC4878701DA}"/>
-              </a:ext>
-            </a:extLst>
-          </p:cNvPr>
-          <p:cNvPicPr>
-            <a:picLocks noChangeAspect="1"/>
-          </p:cNvPicPr>
-          <p:nvPr/>
-        </p:nvPicPr>
-        <p:blipFill>
-          <a:blip r:embed="rId4"/>
-          <a:stretch>
-            <a:fillRect/>
-          </a:stretch>
-        </p:blipFill>
-        <p:spPr>
-          <a:xfrm>
-            <a:off x="4992053" y="3009360"/>
-            <a:ext cx="2151398" cy="1510376"/>
-          </a:xfrm>
-          <a:prstGeom prst="rect">
-            <a:avLst/>
-          </a:prstGeom>
-        </p:spPr>
-      </p:pic>
-      <p:sp>
-        <p:nvSpPr>
-          <p:cNvPr id="63" name="Rectangle : coins arrondis 62">
-            <a:extLst>
-              <a:ext uri="{FF2B5EF4-FFF2-40B4-BE49-F238E27FC236}">
-                <a16:creationId xmlns:a16="http://schemas.microsoft.com/office/drawing/2014/main" id="{DD042865-4156-482D-9360-1287456E3E2B}"/>
+              <a:t>Search &amp; plot</a:t>
+            </a:r>
+          </a:p>
+        </p:txBody>
+      </p:sp>
+      <p:sp>
+        <p:nvSpPr>
+          <p:cNvPr id="37" name="Rectangle : coins arrondis 36">
+            <a:extLst>
+              <a:ext uri="{FF2B5EF4-FFF2-40B4-BE49-F238E27FC236}">
+                <a16:creationId xmlns:a16="http://schemas.microsoft.com/office/drawing/2014/main" id="{F9532241-B33D-41D9-B8A1-74BD6C4F8804}"/>
               </a:ext>
             </a:extLst>
           </p:cNvPr>
@@ -4289,8 +4348,8 @@
         </p:nvSpPr>
         <p:spPr>
           <a:xfrm>
-            <a:off x="10336515" y="2503844"/>
-            <a:ext cx="1820142" cy="764337"/>
+            <a:off x="4597192" y="4750291"/>
+            <a:ext cx="2447972" cy="400110"/>
           </a:xfrm>
           <a:prstGeom prst="roundRect">
             <a:avLst/>
@@ -4324,23 +4383,23 @@
           <a:p>
             <a:pPr algn="ctr"/>
             <a:r>
-              <a:rPr lang="en-US" sz="2000" b="1" dirty="0">
+              <a:rPr lang="en-US" b="1" dirty="0">
                 <a:solidFill>
                   <a:schemeClr val="tx1"/>
                 </a:solidFill>
               </a:rPr>
-              <a:t>.mat (</a:t>
-            </a:r>
-            <a:r>
-              <a:rPr lang="en-US" sz="2000" b="1" dirty="0" err="1">
+              <a:t>(Previous library .</a:t>
+            </a:r>
+            <a:r>
+              <a:rPr lang="en-US" b="1" dirty="0" err="1">
                 <a:solidFill>
                   <a:schemeClr val="tx1"/>
                 </a:solidFill>
               </a:rPr>
-              <a:t>MSFinder</a:t>
-            </a:r>
-            <a:r>
-              <a:rPr lang="en-US" sz="2000" b="1" dirty="0">
+              <a:t>mgf</a:t>
+            </a:r>
+            <a:r>
+              <a:rPr lang="en-US" b="1" dirty="0">
                 <a:solidFill>
                   <a:schemeClr val="tx1"/>
                 </a:solidFill>
@@ -4352,77 +4411,31 @@
       </p:sp>
       <p:sp>
         <p:nvSpPr>
-          <p:cNvPr id="64" name="ZoneTexte 63">
-            <a:extLst>
-              <a:ext uri="{FF2B5EF4-FFF2-40B4-BE49-F238E27FC236}">
-                <a16:creationId xmlns:a16="http://schemas.microsoft.com/office/drawing/2014/main" id="{A9BCE1B9-9E04-4723-B03C-A52D9DC1806C}"/>
-              </a:ext>
-            </a:extLst>
-          </p:cNvPr>
-          <p:cNvSpPr txBox="1"/>
-          <p:nvPr/>
-        </p:nvSpPr>
-        <p:spPr>
-          <a:xfrm>
-            <a:off x="3740124" y="2595455"/>
-            <a:ext cx="2355876" cy="400110"/>
-          </a:xfrm>
-          <a:prstGeom prst="rect">
+          <p:cNvPr id="35" name="Rectangle : coins arrondis 34">
+            <a:extLst>
+              <a:ext uri="{FF2B5EF4-FFF2-40B4-BE49-F238E27FC236}">
+                <a16:creationId xmlns:a16="http://schemas.microsoft.com/office/drawing/2014/main" id="{260881A1-3FB5-4334-8A68-2E99A346CECA}"/>
+              </a:ext>
+            </a:extLst>
+          </p:cNvPr>
+          <p:cNvSpPr/>
+          <p:nvPr/>
+        </p:nvSpPr>
+        <p:spPr>
+          <a:xfrm>
+            <a:off x="445834" y="1928901"/>
+            <a:ext cx="979052" cy="1282720"/>
+          </a:xfrm>
+          <a:prstGeom prst="roundRect">
             <a:avLst/>
           </a:prstGeom>
           <a:noFill/>
-        </p:spPr>
-        <p:txBody>
-          <a:bodyPr wrap="square" rtlCol="0">
-            <a:spAutoFit/>
-          </a:bodyPr>
-          <a:lstStyle/>
-          <a:p>
-            <a:r>
-              <a:rPr lang="en-US" sz="2000" i="1" dirty="0" err="1">
-                <a:solidFill>
-                  <a:srgbClr val="FF0000"/>
-                </a:solidFill>
-              </a:rPr>
-              <a:t>library_generator</a:t>
-            </a:r>
-            <a:r>
-              <a:rPr lang="en-US" sz="2000" i="1" dirty="0">
-                <a:solidFill>
-                  <a:srgbClr val="FF0000"/>
-                </a:solidFill>
-              </a:rPr>
-              <a:t> ()</a:t>
-            </a:r>
-          </a:p>
-        </p:txBody>
-      </p:sp>
-      <p:sp>
-        <p:nvSpPr>
-          <p:cNvPr id="26" name="Rectangle : coins arrondis 25">
-            <a:extLst>
-              <a:ext uri="{FF2B5EF4-FFF2-40B4-BE49-F238E27FC236}">
-                <a16:creationId xmlns:a16="http://schemas.microsoft.com/office/drawing/2014/main" id="{EA0F6D78-D54F-40E6-9D5F-C2C7E4153B1E}"/>
-              </a:ext>
-            </a:extLst>
-          </p:cNvPr>
-          <p:cNvSpPr/>
-          <p:nvPr/>
-        </p:nvSpPr>
-        <p:spPr>
-          <a:xfrm>
-            <a:off x="10360802" y="677379"/>
-            <a:ext cx="1820142" cy="764337"/>
-          </a:xfrm>
-          <a:prstGeom prst="roundRect">
-            <a:avLst/>
-          </a:prstGeom>
-          <a:solidFill>
-            <a:schemeClr val="accent1">
-              <a:lumMod val="60000"/>
-              <a:lumOff val="40000"/>
-            </a:schemeClr>
-          </a:solidFill>
+          <a:ln>
+            <a:solidFill>
+              <a:srgbClr val="FF0000"/>
+            </a:solidFill>
+            <a:prstDash val="sysDot"/>
+          </a:ln>
         </p:spPr>
         <p:style>
           <a:lnRef idx="2">
@@ -4445,50 +4458,72 @@
           <a:lstStyle/>
           <a:p>
             <a:pPr algn="ctr"/>
-            <a:r>
-              <a:rPr lang="en-US" sz="2000" b="1" dirty="0">
+            <a:endParaRPr lang="en-US"/>
+          </a:p>
+        </p:txBody>
+      </p:sp>
+      <p:sp>
+        <p:nvSpPr>
+          <p:cNvPr id="9" name="Rectangle 8">
+            <a:extLst>
+              <a:ext uri="{FF2B5EF4-FFF2-40B4-BE49-F238E27FC236}">
+                <a16:creationId xmlns:a16="http://schemas.microsoft.com/office/drawing/2014/main" id="{4C0DC613-10A5-435C-B8FD-BD83518C38AF}"/>
+              </a:ext>
+            </a:extLst>
+          </p:cNvPr>
+          <p:cNvSpPr/>
+          <p:nvPr/>
+        </p:nvSpPr>
+        <p:spPr>
+          <a:xfrm>
+            <a:off x="-61135" y="3321461"/>
+            <a:ext cx="1980222" cy="646331"/>
+          </a:xfrm>
+          <a:prstGeom prst="rect">
+            <a:avLst/>
+          </a:prstGeom>
+        </p:spPr>
+        <p:txBody>
+          <a:bodyPr wrap="none">
+            <a:spAutoFit/>
+          </a:bodyPr>
+          <a:lstStyle/>
+          <a:p>
+            <a:pPr algn="ctr"/>
+            <a:r>
+              <a:rPr lang="en-US" dirty="0" err="1">
                 <a:solidFill>
-                  <a:schemeClr val="tx1"/>
+                  <a:srgbClr val="FF0000"/>
                 </a:solidFill>
               </a:rPr>
-              <a:t>.</a:t>
-            </a:r>
-            <a:r>
-              <a:rPr lang="en-US" sz="2000" b="1" dirty="0" err="1">
+              <a:t>MSConvertGUI</a:t>
+            </a:r>
+            <a:endParaRPr lang="en-US" dirty="0">
+              <a:solidFill>
+                <a:srgbClr val="FF0000"/>
+              </a:solidFill>
+            </a:endParaRPr>
+          </a:p>
+          <a:p>
+            <a:pPr algn="ctr"/>
+            <a:r>
+              <a:rPr lang="en-US" dirty="0">
                 <a:solidFill>
-                  <a:schemeClr val="tx1"/>
+                  <a:srgbClr val="FF0000"/>
                 </a:solidFill>
               </a:rPr>
-              <a:t>mgf</a:t>
-            </a:r>
-            <a:r>
-              <a:rPr lang="en-US" sz="2000" b="1" dirty="0">
-                <a:solidFill>
-                  <a:schemeClr val="tx1"/>
-                </a:solidFill>
-              </a:rPr>
-              <a:t> </a:t>
-            </a:r>
-          </a:p>
-          <a:p>
-            <a:pPr algn="ctr"/>
-            <a:r>
-              <a:rPr lang="en-US" sz="2000" b="1" dirty="0">
-                <a:solidFill>
-                  <a:schemeClr val="tx1"/>
-                </a:solidFill>
-              </a:rPr>
-              <a:t>(GNPS)</a:t>
-            </a:r>
-          </a:p>
-        </p:txBody>
-      </p:sp>
-      <p:sp>
-        <p:nvSpPr>
-          <p:cNvPr id="37" name="Rectangle : coins arrondis 36">
-            <a:extLst>
-              <a:ext uri="{FF2B5EF4-FFF2-40B4-BE49-F238E27FC236}">
-                <a16:creationId xmlns:a16="http://schemas.microsoft.com/office/drawing/2014/main" id="{F9532241-B33D-41D9-B8A1-74BD6C4F8804}"/>
+              <a:t>or vendor software</a:t>
+            </a:r>
+            <a:endParaRPr lang="en-US" dirty="0"/>
+          </a:p>
+        </p:txBody>
+      </p:sp>
+      <p:sp>
+        <p:nvSpPr>
+          <p:cNvPr id="38" name="Rectangle : coins arrondis 37">
+            <a:extLst>
+              <a:ext uri="{FF2B5EF4-FFF2-40B4-BE49-F238E27FC236}">
+                <a16:creationId xmlns:a16="http://schemas.microsoft.com/office/drawing/2014/main" id="{51D7B3C8-DF9E-4C53-AC4B-2BEDBEE893DB}"/>
               </a:ext>
             </a:extLst>
           </p:cNvPr>
@@ -4497,8 +4532,8 @@
         </p:nvSpPr>
         <p:spPr>
           <a:xfrm>
-            <a:off x="4597192" y="4750291"/>
-            <a:ext cx="2447972" cy="400110"/>
+            <a:off x="7913209" y="2598949"/>
+            <a:ext cx="1910203" cy="764337"/>
           </a:xfrm>
           <a:prstGeom prst="roundRect">
             <a:avLst/>
@@ -4532,38 +4567,203 @@
           <a:p>
             <a:pPr algn="ctr"/>
             <a:r>
-              <a:rPr lang="en-US" b="1" dirty="0">
+              <a:rPr lang="en-US" sz="2000" b="1" dirty="0">
                 <a:solidFill>
                   <a:schemeClr val="tx1"/>
                 </a:solidFill>
               </a:rPr>
-              <a:t>(Previous library .</a:t>
-            </a:r>
-            <a:r>
-              <a:rPr lang="en-US" b="1" dirty="0" err="1">
+              <a:t>Merged spectral library</a:t>
+            </a:r>
+          </a:p>
+        </p:txBody>
+      </p:sp>
+      <p:sp>
+        <p:nvSpPr>
+          <p:cNvPr id="70" name="Accolade fermante 69">
+            <a:extLst>
+              <a:ext uri="{FF2B5EF4-FFF2-40B4-BE49-F238E27FC236}">
+                <a16:creationId xmlns:a16="http://schemas.microsoft.com/office/drawing/2014/main" id="{4CAA33B9-6C32-4AB6-855E-E8EBA9E3AD66}"/>
+              </a:ext>
+            </a:extLst>
+          </p:cNvPr>
+          <p:cNvSpPr/>
+          <p:nvPr/>
+        </p:nvSpPr>
+        <p:spPr>
+          <a:xfrm>
+            <a:off x="7150129" y="949130"/>
+            <a:ext cx="679267" cy="4019541"/>
+          </a:xfrm>
+          <a:prstGeom prst="rightBrace">
+            <a:avLst>
+              <a:gd name="adj1" fmla="val 0"/>
+              <a:gd name="adj2" fmla="val 50000"/>
+            </a:avLst>
+          </a:prstGeom>
+          <a:ln w="19050">
+            <a:solidFill>
+              <a:schemeClr val="tx1"/>
+            </a:solidFill>
+            <a:headEnd type="none" w="med" len="med"/>
+            <a:tailEnd type="none" w="med" len="med"/>
+          </a:ln>
+        </p:spPr>
+        <p:style>
+          <a:lnRef idx="1">
+            <a:schemeClr val="accent1"/>
+          </a:lnRef>
+          <a:fillRef idx="0">
+            <a:schemeClr val="accent1"/>
+          </a:fillRef>
+          <a:effectRef idx="0">
+            <a:schemeClr val="accent1"/>
+          </a:effectRef>
+          <a:fontRef idx="minor">
+            <a:schemeClr val="tx1"/>
+          </a:fontRef>
+        </p:style>
+        <p:txBody>
+          <a:bodyPr rtlCol="0" anchor="ctr"/>
+          <a:lstStyle/>
+          <a:p>
+            <a:pPr algn="ctr"/>
+            <a:endParaRPr lang="en-US" dirty="0"/>
+          </a:p>
+        </p:txBody>
+      </p:sp>
+      <p:cxnSp>
+        <p:nvCxnSpPr>
+          <p:cNvPr id="74" name="Connecteur droit avec flèche 73">
+            <a:extLst>
+              <a:ext uri="{FF2B5EF4-FFF2-40B4-BE49-F238E27FC236}">
+                <a16:creationId xmlns:a16="http://schemas.microsoft.com/office/drawing/2014/main" id="{BB41DC72-A584-4A44-8196-194AC991F75B}"/>
+              </a:ext>
+            </a:extLst>
+          </p:cNvPr>
+          <p:cNvCxnSpPr>
+            <a:cxnSpLocks/>
+            <a:stCxn id="38" idx="0"/>
+          </p:cNvCxnSpPr>
+          <p:nvPr/>
+        </p:nvCxnSpPr>
+        <p:spPr>
+          <a:xfrm flipV="1">
+            <a:off x="8868311" y="1093155"/>
+            <a:ext cx="1776387" cy="1505794"/>
+          </a:xfrm>
+          <a:prstGeom prst="straightConnector1">
+            <a:avLst/>
+          </a:prstGeom>
+          <a:ln w="19050">
+            <a:solidFill>
+              <a:schemeClr val="tx1"/>
+            </a:solidFill>
+            <a:tailEnd type="triangle"/>
+          </a:ln>
+        </p:spPr>
+        <p:style>
+          <a:lnRef idx="1">
+            <a:schemeClr val="accent1"/>
+          </a:lnRef>
+          <a:fillRef idx="0">
+            <a:schemeClr val="accent1"/>
+          </a:fillRef>
+          <a:effectRef idx="0">
+            <a:schemeClr val="accent1"/>
+          </a:effectRef>
+          <a:fontRef idx="minor">
+            <a:schemeClr val="tx1"/>
+          </a:fontRef>
+        </p:style>
+      </p:cxnSp>
+      <p:sp>
+        <p:nvSpPr>
+          <p:cNvPr id="85" name="Rectangle 84">
+            <a:extLst>
+              <a:ext uri="{FF2B5EF4-FFF2-40B4-BE49-F238E27FC236}">
+                <a16:creationId xmlns:a16="http://schemas.microsoft.com/office/drawing/2014/main" id="{9F8CD7CC-A396-4C32-9A9E-D9DF4E873528}"/>
+              </a:ext>
+            </a:extLst>
+          </p:cNvPr>
+          <p:cNvSpPr/>
+          <p:nvPr/>
+        </p:nvSpPr>
+        <p:spPr>
+          <a:xfrm>
+            <a:off x="8966597" y="3652589"/>
+            <a:ext cx="2408480" cy="1015663"/>
+          </a:xfrm>
+          <a:prstGeom prst="rect">
+            <a:avLst/>
+          </a:prstGeom>
+        </p:spPr>
+        <p:txBody>
+          <a:bodyPr wrap="none">
+            <a:spAutoFit/>
+          </a:bodyPr>
+          <a:lstStyle/>
+          <a:p>
+            <a:r>
+              <a:rPr lang="en-US" sz="2000" i="1" dirty="0" err="1">
                 <a:solidFill>
-                  <a:schemeClr val="tx1"/>
+                  <a:srgbClr val="FF0000"/>
                 </a:solidFill>
               </a:rPr>
-              <a:t>mgf</a:t>
-            </a:r>
-            <a:r>
-              <a:rPr lang="en-US" b="1" dirty="0">
+              <a:t>CSI_FingerID_writer</a:t>
+            </a:r>
+            <a:r>
+              <a:rPr lang="en-US" sz="2000" i="1" dirty="0">
                 <a:solidFill>
-                  <a:schemeClr val="tx1"/>
+                  <a:srgbClr val="FF0000"/>
                 </a:solidFill>
               </a:rPr>
-              <a:t>)</a:t>
-            </a:r>
-          </a:p>
-        </p:txBody>
-      </p:sp>
-      <p:sp>
-        <p:nvSpPr>
-          <p:cNvPr id="28" name="Rectangle : coins arrondis 27">
-            <a:extLst>
-              <a:ext uri="{FF2B5EF4-FFF2-40B4-BE49-F238E27FC236}">
-                <a16:creationId xmlns:a16="http://schemas.microsoft.com/office/drawing/2014/main" id="{3B83342D-C75D-4DE4-BE35-5447D146D86B}"/>
+              <a:t>()</a:t>
+            </a:r>
+          </a:p>
+          <a:p>
+            <a:r>
+              <a:rPr lang="en-US" sz="2000" i="1" dirty="0" err="1">
+                <a:solidFill>
+                  <a:srgbClr val="FF0000"/>
+                </a:solidFill>
+              </a:rPr>
+              <a:t>MSFinder_writer</a:t>
+            </a:r>
+            <a:r>
+              <a:rPr lang="en-US" sz="2000" i="1" dirty="0">
+                <a:solidFill>
+                  <a:srgbClr val="FF0000"/>
+                </a:solidFill>
+              </a:rPr>
+              <a:t>()</a:t>
+            </a:r>
+          </a:p>
+          <a:p>
+            <a:r>
+              <a:rPr lang="en-US" sz="2000" i="1" dirty="0" err="1">
+                <a:solidFill>
+                  <a:srgbClr val="FF0000"/>
+                </a:solidFill>
+              </a:rPr>
+              <a:t>MetFrag_writer</a:t>
+            </a:r>
+            <a:r>
+              <a:rPr lang="en-US" sz="2000" i="1" dirty="0">
+                <a:solidFill>
+                  <a:srgbClr val="FF0000"/>
+                </a:solidFill>
+              </a:rPr>
+              <a:t>()</a:t>
+            </a:r>
+          </a:p>
+        </p:txBody>
+      </p:sp>
+      <p:sp>
+        <p:nvSpPr>
+          <p:cNvPr id="44" name="Rectangle 43">
+            <a:extLst>
+              <a:ext uri="{FF2B5EF4-FFF2-40B4-BE49-F238E27FC236}">
+                <a16:creationId xmlns:a16="http://schemas.microsoft.com/office/drawing/2014/main" id="{765DDFE1-8F93-4C3D-8D2D-4C7F8B15EA75}"/>
               </a:ext>
             </a:extLst>
           </p:cNvPr>
@@ -4572,18 +4772,128 @@
         </p:nvSpPr>
         <p:spPr>
           <a:xfrm>
-            <a:off x="10332500" y="4276762"/>
-            <a:ext cx="1820142" cy="764337"/>
-          </a:xfrm>
-          <a:prstGeom prst="roundRect">
-            <a:avLst/>
-          </a:prstGeom>
-          <a:solidFill>
-            <a:schemeClr val="accent1">
-              <a:lumMod val="60000"/>
-              <a:lumOff val="40000"/>
-            </a:schemeClr>
-          </a:solidFill>
+            <a:off x="3490380" y="3680436"/>
+            <a:ext cx="1443793" cy="400110"/>
+          </a:xfrm>
+          <a:prstGeom prst="rect">
+            <a:avLst/>
+          </a:prstGeom>
+        </p:spPr>
+        <p:txBody>
+          <a:bodyPr wrap="none">
+            <a:spAutoFit/>
+          </a:bodyPr>
+          <a:lstStyle/>
+          <a:p>
+            <a:r>
+              <a:rPr lang="en-US" sz="2000" i="1" dirty="0"/>
+              <a:t>Extract MS2</a:t>
+            </a:r>
+          </a:p>
+        </p:txBody>
+      </p:sp>
+      <p:sp>
+        <p:nvSpPr>
+          <p:cNvPr id="20" name="Rectangle 19">
+            <a:extLst>
+              <a:ext uri="{FF2B5EF4-FFF2-40B4-BE49-F238E27FC236}">
+                <a16:creationId xmlns:a16="http://schemas.microsoft.com/office/drawing/2014/main" id="{B9AF68C0-A521-4599-9FE0-4F7090D80718}"/>
+              </a:ext>
+            </a:extLst>
+          </p:cNvPr>
+          <p:cNvSpPr/>
+          <p:nvPr/>
+        </p:nvSpPr>
+        <p:spPr>
+          <a:xfrm>
+            <a:off x="3490380" y="1698063"/>
+            <a:ext cx="1443793" cy="400110"/>
+          </a:xfrm>
+          <a:prstGeom prst="rect">
+            <a:avLst/>
+          </a:prstGeom>
+        </p:spPr>
+        <p:txBody>
+          <a:bodyPr wrap="none">
+            <a:spAutoFit/>
+          </a:bodyPr>
+          <a:lstStyle/>
+          <a:p>
+            <a:r>
+              <a:rPr lang="en-US" sz="2000" i="1" dirty="0"/>
+              <a:t>Extract MS1</a:t>
+            </a:r>
+          </a:p>
+        </p:txBody>
+      </p:sp>
+      <p:sp>
+        <p:nvSpPr>
+          <p:cNvPr id="45" name="ZoneTexte 44">
+            <a:extLst>
+              <a:ext uri="{FF2B5EF4-FFF2-40B4-BE49-F238E27FC236}">
+                <a16:creationId xmlns:a16="http://schemas.microsoft.com/office/drawing/2014/main" id="{18AAE3A4-5412-42E1-840A-CD53447501B5}"/>
+              </a:ext>
+            </a:extLst>
+          </p:cNvPr>
+          <p:cNvSpPr txBox="1"/>
+          <p:nvPr/>
+        </p:nvSpPr>
+        <p:spPr>
+          <a:xfrm>
+            <a:off x="6276760" y="461054"/>
+            <a:ext cx="2103153" cy="400110"/>
+          </a:xfrm>
+          <a:prstGeom prst="rect">
+            <a:avLst/>
+          </a:prstGeom>
+          <a:noFill/>
+        </p:spPr>
+        <p:txBody>
+          <a:bodyPr wrap="square" rtlCol="0">
+            <a:spAutoFit/>
+          </a:bodyPr>
+          <a:lstStyle/>
+          <a:p>
+            <a:pPr algn="ctr"/>
+            <a:r>
+              <a:rPr lang="en-US" sz="2000" i="1" dirty="0" err="1">
+                <a:solidFill>
+                  <a:srgbClr val="FF0000"/>
+                </a:solidFill>
+              </a:rPr>
+              <a:t>process_library</a:t>
+            </a:r>
+            <a:r>
+              <a:rPr lang="en-US" sz="2000" i="1" dirty="0">
+                <a:solidFill>
+                  <a:srgbClr val="FF0000"/>
+                </a:solidFill>
+              </a:rPr>
+              <a:t>()</a:t>
+            </a:r>
+          </a:p>
+        </p:txBody>
+      </p:sp>
+      <p:sp>
+        <p:nvSpPr>
+          <p:cNvPr id="46" name="Flèche : bas 45">
+            <a:extLst>
+              <a:ext uri="{FF2B5EF4-FFF2-40B4-BE49-F238E27FC236}">
+                <a16:creationId xmlns:a16="http://schemas.microsoft.com/office/drawing/2014/main" id="{237D30B9-AFB0-4599-80B3-3C0A20800A6F}"/>
+              </a:ext>
+            </a:extLst>
+          </p:cNvPr>
+          <p:cNvSpPr/>
+          <p:nvPr/>
+        </p:nvSpPr>
+        <p:spPr>
+          <a:xfrm rot="14245797">
+            <a:off x="4129812" y="4290102"/>
+            <a:ext cx="380758" cy="476994"/>
+          </a:xfrm>
+          <a:prstGeom prst="downArrow">
+            <a:avLst/>
+          </a:prstGeom>
         </p:spPr>
         <p:style>
           <a:lnRef idx="2">
@@ -4606,66 +4916,60 @@
           <a:lstStyle/>
           <a:p>
             <a:pPr algn="ctr"/>
-            <a:r>
-              <a:rPr lang="en-US" sz="2000" b="1" dirty="0">
-                <a:solidFill>
-                  <a:schemeClr val="tx1"/>
-                </a:solidFill>
-              </a:rPr>
-              <a:t>.</a:t>
-            </a:r>
-            <a:r>
-              <a:rPr lang="en-US" sz="2000" b="1" dirty="0" err="1">
-                <a:solidFill>
-                  <a:schemeClr val="tx1"/>
-                </a:solidFill>
-              </a:rPr>
-              <a:t>ms</a:t>
-            </a:r>
-            <a:r>
-              <a:rPr lang="en-US" sz="2000" b="1" dirty="0">
-                <a:solidFill>
-                  <a:schemeClr val="tx1"/>
-                </a:solidFill>
-              </a:rPr>
-              <a:t> </a:t>
-            </a:r>
-          </a:p>
-          <a:p>
-            <a:pPr algn="ctr"/>
-            <a:r>
-              <a:rPr lang="en-US" sz="2000" b="1" dirty="0">
-                <a:solidFill>
-                  <a:schemeClr val="tx1"/>
-                </a:solidFill>
-              </a:rPr>
-              <a:t>(CSI-</a:t>
-            </a:r>
-            <a:r>
-              <a:rPr lang="en-US" sz="2000" b="1" dirty="0" err="1">
-                <a:solidFill>
-                  <a:schemeClr val="tx1"/>
-                </a:solidFill>
-              </a:rPr>
-              <a:t>FingerID</a:t>
-            </a:r>
-            <a:r>
-              <a:rPr lang="en-US" sz="2000" b="1" dirty="0">
-                <a:solidFill>
-                  <a:schemeClr val="tx1"/>
-                </a:solidFill>
-              </a:rPr>
-              <a:t>)</a:t>
-            </a:r>
-          </a:p>
-        </p:txBody>
-      </p:sp>
-      <p:sp>
-        <p:nvSpPr>
-          <p:cNvPr id="2" name="Flèche : bas 1">
-            <a:extLst>
-              <a:ext uri="{FF2B5EF4-FFF2-40B4-BE49-F238E27FC236}">
-                <a16:creationId xmlns:a16="http://schemas.microsoft.com/office/drawing/2014/main" id="{EC24FCEE-8694-46F2-8CF7-7B58A7D2CB3F}"/>
+            <a:endParaRPr lang="en-US"/>
+          </a:p>
+        </p:txBody>
+      </p:sp>
+      <p:cxnSp>
+        <p:nvCxnSpPr>
+          <p:cNvPr id="47" name="Connecteur droit avec flèche 46">
+            <a:extLst>
+              <a:ext uri="{FF2B5EF4-FFF2-40B4-BE49-F238E27FC236}">
+                <a16:creationId xmlns:a16="http://schemas.microsoft.com/office/drawing/2014/main" id="{4AD6E33B-2FDB-40A7-A1B3-586F903A4A8A}"/>
+              </a:ext>
+            </a:extLst>
+          </p:cNvPr>
+          <p:cNvCxnSpPr>
+            <a:cxnSpLocks/>
+          </p:cNvCxnSpPr>
+          <p:nvPr/>
+        </p:nvCxnSpPr>
+        <p:spPr>
+          <a:xfrm>
+            <a:off x="8868310" y="3379831"/>
+            <a:ext cx="5347" cy="1554480"/>
+          </a:xfrm>
+          <a:prstGeom prst="straightConnector1">
+            <a:avLst/>
+          </a:prstGeom>
+          <a:ln w="19050">
+            <a:solidFill>
+              <a:schemeClr val="tx1"/>
+            </a:solidFill>
+            <a:tailEnd type="triangle"/>
+          </a:ln>
+        </p:spPr>
+        <p:style>
+          <a:lnRef idx="1">
+            <a:schemeClr val="accent1"/>
+          </a:lnRef>
+          <a:fillRef idx="0">
+            <a:schemeClr val="accent1"/>
+          </a:fillRef>
+          <a:effectRef idx="0">
+            <a:schemeClr val="accent1"/>
+          </a:effectRef>
+          <a:fontRef idx="minor">
+            <a:schemeClr val="tx1"/>
+          </a:fontRef>
+        </p:style>
+      </p:cxnSp>
+      <p:sp>
+        <p:nvSpPr>
+          <p:cNvPr id="48" name="Rectangle : coins arrondis 47">
+            <a:extLst>
+              <a:ext uri="{FF2B5EF4-FFF2-40B4-BE49-F238E27FC236}">
+                <a16:creationId xmlns:a16="http://schemas.microsoft.com/office/drawing/2014/main" id="{DBCD95AE-A119-40B6-BCD1-336406727360}"/>
               </a:ext>
             </a:extLst>
           </p:cNvPr>
@@ -4674,12 +4978,18 @@
         </p:nvSpPr>
         <p:spPr>
           <a:xfrm>
-            <a:off x="11039484" y="5309294"/>
-            <a:ext cx="380758" cy="476994"/>
-          </a:xfrm>
-          <a:prstGeom prst="downArrow">
-            <a:avLst/>
-          </a:prstGeom>
+            <a:off x="7896832" y="4922574"/>
+            <a:ext cx="2109276" cy="578607"/>
+          </a:xfrm>
+          <a:prstGeom prst="roundRect">
+            <a:avLst/>
+          </a:prstGeom>
+          <a:solidFill>
+            <a:schemeClr val="accent1">
+              <a:lumMod val="60000"/>
+              <a:lumOff val="40000"/>
+            </a:schemeClr>
+          </a:solidFill>
         </p:spPr>
         <p:style>
           <a:lnRef idx="2">
@@ -4702,66 +5012,28 @@
           <a:lstStyle/>
           <a:p>
             <a:pPr algn="ctr"/>
-            <a:endParaRPr lang="en-US"/>
-          </a:p>
-        </p:txBody>
-      </p:sp>
-      <p:sp>
-        <p:nvSpPr>
-          <p:cNvPr id="3" name="ZoneTexte 2">
-            <a:extLst>
-              <a:ext uri="{FF2B5EF4-FFF2-40B4-BE49-F238E27FC236}">
-                <a16:creationId xmlns:a16="http://schemas.microsoft.com/office/drawing/2014/main" id="{EAA9D326-D932-4DEA-AA7B-F51DC0DFCB5E}"/>
-              </a:ext>
-            </a:extLst>
-          </p:cNvPr>
-          <p:cNvSpPr txBox="1"/>
-          <p:nvPr/>
-        </p:nvSpPr>
-        <p:spPr>
-          <a:xfrm>
-            <a:off x="10241731" y="5828188"/>
-            <a:ext cx="1976264" cy="1015663"/>
-          </a:xfrm>
-          <a:prstGeom prst="rect">
-            <a:avLst/>
-          </a:prstGeom>
-          <a:noFill/>
-        </p:spPr>
-        <p:txBody>
-          <a:bodyPr wrap="square" rtlCol="0">
-            <a:spAutoFit/>
-          </a:bodyPr>
-          <a:lstStyle/>
-          <a:p>
-            <a:pPr algn="ctr"/>
-            <a:r>
-              <a:rPr lang="en-US" sz="2000" dirty="0"/>
-              <a:t>Batch-processing</a:t>
-            </a:r>
-          </a:p>
-          <a:p>
-            <a:pPr algn="ctr"/>
-            <a:r>
-              <a:rPr lang="en-US" sz="2000" dirty="0"/>
-              <a:t>In-house library</a:t>
-            </a:r>
-          </a:p>
-          <a:p>
-            <a:pPr algn="ctr"/>
-            <a:r>
-              <a:rPr lang="en-US" sz="2000" dirty="0"/>
-              <a:t>…</a:t>
-            </a:r>
-          </a:p>
-        </p:txBody>
-      </p:sp>
-      <p:sp>
-        <p:nvSpPr>
-          <p:cNvPr id="35" name="Rectangle : coins arrondis 34">
-            <a:extLst>
-              <a:ext uri="{FF2B5EF4-FFF2-40B4-BE49-F238E27FC236}">
-                <a16:creationId xmlns:a16="http://schemas.microsoft.com/office/drawing/2014/main" id="{260881A1-3FB5-4334-8A68-2E99A346CECA}"/>
+            <a:r>
+              <a:rPr lang="en-US" sz="2000" b="1" dirty="0">
+                <a:solidFill>
+                  <a:schemeClr val="tx1"/>
+                </a:solidFill>
+              </a:rPr>
+              <a:t>Adapted formats</a:t>
+            </a:r>
+            <a:endParaRPr lang="en-US" i="1" dirty="0">
+              <a:solidFill>
+                <a:schemeClr val="tx1"/>
+              </a:solidFill>
+            </a:endParaRPr>
+          </a:p>
+        </p:txBody>
+      </p:sp>
+      <p:sp>
+        <p:nvSpPr>
+          <p:cNvPr id="49" name="Rectangle : coins arrondis 48">
+            <a:extLst>
+              <a:ext uri="{FF2B5EF4-FFF2-40B4-BE49-F238E27FC236}">
+                <a16:creationId xmlns:a16="http://schemas.microsoft.com/office/drawing/2014/main" id="{DA16BB92-C2E2-4028-A29F-7A95244ED932}"/>
               </a:ext>
             </a:extLst>
           </p:cNvPr>
@@ -4770,19 +5042,18 @@
         </p:nvSpPr>
         <p:spPr>
           <a:xfrm>
-            <a:off x="445834" y="1928901"/>
-            <a:ext cx="979052" cy="1282720"/>
+            <a:off x="10671812" y="4759182"/>
+            <a:ext cx="2140722" cy="847256"/>
           </a:xfrm>
           <a:prstGeom prst="roundRect">
             <a:avLst/>
           </a:prstGeom>
-          <a:noFill/>
-          <a:ln>
-            <a:solidFill>
-              <a:srgbClr val="FF0000"/>
-            </a:solidFill>
-            <a:prstDash val="sysDot"/>
-          </a:ln>
+          <a:solidFill>
+            <a:schemeClr val="accent1">
+              <a:lumMod val="60000"/>
+              <a:lumOff val="40000"/>
+            </a:schemeClr>
+          </a:solidFill>
         </p:spPr>
         <p:style>
           <a:lnRef idx="2">
@@ -4805,151 +5076,53 @@
           <a:lstStyle/>
           <a:p>
             <a:pPr algn="ctr"/>
-            <a:endParaRPr lang="en-US"/>
-          </a:p>
-        </p:txBody>
-      </p:sp>
-      <p:sp>
-        <p:nvSpPr>
-          <p:cNvPr id="9" name="Rectangle 8">
-            <a:extLst>
-              <a:ext uri="{FF2B5EF4-FFF2-40B4-BE49-F238E27FC236}">
-                <a16:creationId xmlns:a16="http://schemas.microsoft.com/office/drawing/2014/main" id="{4C0DC613-10A5-435C-B8FD-BD83518C38AF}"/>
-              </a:ext>
-            </a:extLst>
-          </p:cNvPr>
-          <p:cNvSpPr/>
-          <p:nvPr/>
-        </p:nvSpPr>
-        <p:spPr>
-          <a:xfrm>
-            <a:off x="-79025" y="1270025"/>
-            <a:ext cx="1980222" cy="646331"/>
-          </a:xfrm>
-          <a:prstGeom prst="rect">
-            <a:avLst/>
-          </a:prstGeom>
-        </p:spPr>
-        <p:txBody>
-          <a:bodyPr wrap="none">
-            <a:spAutoFit/>
-          </a:bodyPr>
-          <a:lstStyle/>
-          <a:p>
-            <a:pPr algn="ctr"/>
-            <a:r>
-              <a:rPr lang="en-US" dirty="0" err="1">
-                <a:solidFill>
-                  <a:srgbClr val="FF0000"/>
-                </a:solidFill>
-              </a:rPr>
-              <a:t>MSConvertGUI</a:t>
-            </a:r>
-            <a:endParaRPr lang="en-US" dirty="0">
-              <a:solidFill>
-                <a:srgbClr val="FF0000"/>
-              </a:solidFill>
-            </a:endParaRPr>
-          </a:p>
-          <a:p>
-            <a:pPr algn="ctr"/>
-            <a:r>
-              <a:rPr lang="en-US" dirty="0">
-                <a:solidFill>
-                  <a:srgbClr val="FF0000"/>
-                </a:solidFill>
-              </a:rPr>
-              <a:t>or vendor software</a:t>
-            </a:r>
-            <a:endParaRPr lang="en-US" dirty="0"/>
-          </a:p>
-        </p:txBody>
-      </p:sp>
-      <p:sp>
-        <p:nvSpPr>
-          <p:cNvPr id="38" name="Rectangle : coins arrondis 37">
-            <a:extLst>
-              <a:ext uri="{FF2B5EF4-FFF2-40B4-BE49-F238E27FC236}">
-                <a16:creationId xmlns:a16="http://schemas.microsoft.com/office/drawing/2014/main" id="{51D7B3C8-DF9E-4C53-AC4B-2BEDBEE893DB}"/>
-              </a:ext>
-            </a:extLst>
-          </p:cNvPr>
-          <p:cNvSpPr/>
-          <p:nvPr/>
-        </p:nvSpPr>
-        <p:spPr>
-          <a:xfrm>
-            <a:off x="7913209" y="2598949"/>
-            <a:ext cx="1910203" cy="764337"/>
-          </a:xfrm>
-          <a:prstGeom prst="roundRect">
-            <a:avLst/>
-          </a:prstGeom>
-          <a:solidFill>
-            <a:schemeClr val="accent1">
-              <a:lumMod val="60000"/>
-              <a:lumOff val="40000"/>
-            </a:schemeClr>
-          </a:solidFill>
-        </p:spPr>
-        <p:style>
-          <a:lnRef idx="2">
-            <a:schemeClr val="accent1">
-              <a:shade val="50000"/>
-            </a:schemeClr>
-          </a:lnRef>
-          <a:fillRef idx="1">
-            <a:schemeClr val="accent1"/>
-          </a:fillRef>
-          <a:effectRef idx="0">
-            <a:schemeClr val="accent1"/>
-          </a:effectRef>
-          <a:fontRef idx="minor">
-            <a:schemeClr val="lt1"/>
-          </a:fontRef>
-        </p:style>
-        <p:txBody>
-          <a:bodyPr rtlCol="0" anchor="ctr"/>
-          <a:lstStyle/>
-          <a:p>
             <a:r>
               <a:rPr lang="en-US" sz="2000" b="1" dirty="0">
                 <a:solidFill>
                   <a:schemeClr val="tx1"/>
                 </a:solidFill>
               </a:rPr>
-              <a:t>Merged spectral library</a:t>
+              <a:t>Smart algorithms</a:t>
+            </a:r>
+          </a:p>
+          <a:p>
+            <a:pPr algn="ctr"/>
+            <a:r>
+              <a:rPr lang="en-US" i="1" dirty="0">
+                <a:solidFill>
+                  <a:schemeClr val="tx1"/>
+                </a:solidFill>
+              </a:rPr>
+              <a:t>Batch processing</a:t>
             </a:r>
           </a:p>
         </p:txBody>
       </p:sp>
       <p:cxnSp>
         <p:nvCxnSpPr>
-          <p:cNvPr id="68" name="Connecteur droit avec flèche 67">
-            <a:extLst>
-              <a:ext uri="{FF2B5EF4-FFF2-40B4-BE49-F238E27FC236}">
-                <a16:creationId xmlns:a16="http://schemas.microsoft.com/office/drawing/2014/main" id="{51AC4E9F-1EFD-4541-B66C-45D3333D59CC}"/>
+          <p:cNvPr id="56" name="Connecteur droit avec flèche 55">
+            <a:extLst>
+              <a:ext uri="{FF2B5EF4-FFF2-40B4-BE49-F238E27FC236}">
+                <a16:creationId xmlns:a16="http://schemas.microsoft.com/office/drawing/2014/main" id="{B2EEDD52-7689-4229-A5B2-0159DAE77980}"/>
               </a:ext>
             </a:extLst>
           </p:cNvPr>
           <p:cNvCxnSpPr>
             <a:cxnSpLocks/>
-            <a:stCxn id="38" idx="2"/>
-            <a:endCxn id="59" idx="0"/>
           </p:cNvCxnSpPr>
           <p:nvPr/>
         </p:nvCxnSpPr>
         <p:spPr>
-          <a:xfrm flipH="1">
-            <a:off x="8379913" y="3363286"/>
-            <a:ext cx="488398" cy="2411093"/>
+          <a:xfrm>
+            <a:off x="10006108" y="5211877"/>
+            <a:ext cx="640080" cy="0"/>
           </a:xfrm>
           <a:prstGeom prst="straightConnector1">
             <a:avLst/>
           </a:prstGeom>
-          <a:ln>
+          <a:ln w="19050">
             <a:solidFill>
-              <a:srgbClr val="FF0000"/>
+              <a:schemeClr val="tx1"/>
             </a:solidFill>
             <a:tailEnd type="triangle"/>
           </a:ln>
@@ -4969,540 +5142,6 @@
           </a:fontRef>
         </p:style>
       </p:cxnSp>
-      <p:sp>
-        <p:nvSpPr>
-          <p:cNvPr id="69" name="Rectangle 68">
-            <a:extLst>
-              <a:ext uri="{FF2B5EF4-FFF2-40B4-BE49-F238E27FC236}">
-                <a16:creationId xmlns:a16="http://schemas.microsoft.com/office/drawing/2014/main" id="{9A12D535-AEAA-47EA-8DF3-3CDFC3EAB745}"/>
-              </a:ext>
-            </a:extLst>
-          </p:cNvPr>
-          <p:cNvSpPr/>
-          <p:nvPr/>
-        </p:nvSpPr>
-        <p:spPr>
-          <a:xfrm>
-            <a:off x="7832131" y="4770880"/>
-            <a:ext cx="1798441" cy="369332"/>
-          </a:xfrm>
-          <a:prstGeom prst="rect">
-            <a:avLst/>
-          </a:prstGeom>
-        </p:spPr>
-        <p:txBody>
-          <a:bodyPr wrap="none">
-            <a:spAutoFit/>
-          </a:bodyPr>
-          <a:lstStyle/>
-          <a:p>
-            <a:r>
-              <a:rPr lang="en-US" dirty="0" err="1">
-                <a:solidFill>
-                  <a:srgbClr val="FF0000"/>
-                </a:solidFill>
-              </a:rPr>
-              <a:t>MetFrag_writer</a:t>
-            </a:r>
-            <a:r>
-              <a:rPr lang="en-US" dirty="0">
-                <a:solidFill>
-                  <a:srgbClr val="FF0000"/>
-                </a:solidFill>
-              </a:rPr>
-              <a:t>()</a:t>
-            </a:r>
-          </a:p>
-        </p:txBody>
-      </p:sp>
-      <p:sp>
-        <p:nvSpPr>
-          <p:cNvPr id="70" name="Accolade fermante 69">
-            <a:extLst>
-              <a:ext uri="{FF2B5EF4-FFF2-40B4-BE49-F238E27FC236}">
-                <a16:creationId xmlns:a16="http://schemas.microsoft.com/office/drawing/2014/main" id="{4CAA33B9-6C32-4AB6-855E-E8EBA9E3AD66}"/>
-              </a:ext>
-            </a:extLst>
-          </p:cNvPr>
-          <p:cNvSpPr/>
-          <p:nvPr/>
-        </p:nvSpPr>
-        <p:spPr>
-          <a:xfrm>
-            <a:off x="7150129" y="949130"/>
-            <a:ext cx="679267" cy="4019541"/>
-          </a:xfrm>
-          <a:prstGeom prst="rightBrace">
-            <a:avLst>
-              <a:gd name="adj1" fmla="val 0"/>
-              <a:gd name="adj2" fmla="val 50000"/>
-            </a:avLst>
-          </a:prstGeom>
-          <a:ln w="19050">
-            <a:solidFill>
-              <a:schemeClr val="tx1"/>
-            </a:solidFill>
-            <a:headEnd type="none" w="med" len="med"/>
-            <a:tailEnd type="none" w="med" len="med"/>
-          </a:ln>
-        </p:spPr>
-        <p:style>
-          <a:lnRef idx="1">
-            <a:schemeClr val="accent1"/>
-          </a:lnRef>
-          <a:fillRef idx="0">
-            <a:schemeClr val="accent1"/>
-          </a:fillRef>
-          <a:effectRef idx="0">
-            <a:schemeClr val="accent1"/>
-          </a:effectRef>
-          <a:fontRef idx="minor">
-            <a:schemeClr val="tx1"/>
-          </a:fontRef>
-        </p:style>
-        <p:txBody>
-          <a:bodyPr rtlCol="0" anchor="ctr"/>
-          <a:lstStyle/>
-          <a:p>
-            <a:pPr algn="ctr"/>
-            <a:endParaRPr lang="en-US" dirty="0"/>
-          </a:p>
-        </p:txBody>
-      </p:sp>
-      <p:cxnSp>
-        <p:nvCxnSpPr>
-          <p:cNvPr id="74" name="Connecteur droit avec flèche 73">
-            <a:extLst>
-              <a:ext uri="{FF2B5EF4-FFF2-40B4-BE49-F238E27FC236}">
-                <a16:creationId xmlns:a16="http://schemas.microsoft.com/office/drawing/2014/main" id="{BB41DC72-A584-4A44-8196-194AC991F75B}"/>
-              </a:ext>
-            </a:extLst>
-          </p:cNvPr>
-          <p:cNvCxnSpPr>
-            <a:cxnSpLocks/>
-          </p:cNvCxnSpPr>
-          <p:nvPr/>
-        </p:nvCxnSpPr>
-        <p:spPr>
-          <a:xfrm flipV="1">
-            <a:off x="8886383" y="1105426"/>
-            <a:ext cx="1474419" cy="1480996"/>
-          </a:xfrm>
-          <a:prstGeom prst="straightConnector1">
-            <a:avLst/>
-          </a:prstGeom>
-          <a:ln>
-            <a:solidFill>
-              <a:srgbClr val="FF0000"/>
-            </a:solidFill>
-            <a:tailEnd type="triangle"/>
-          </a:ln>
-        </p:spPr>
-        <p:style>
-          <a:lnRef idx="1">
-            <a:schemeClr val="accent1"/>
-          </a:lnRef>
-          <a:fillRef idx="0">
-            <a:schemeClr val="accent1"/>
-          </a:fillRef>
-          <a:effectRef idx="0">
-            <a:schemeClr val="accent1"/>
-          </a:effectRef>
-          <a:fontRef idx="minor">
-            <a:schemeClr val="tx1"/>
-          </a:fontRef>
-        </p:style>
-      </p:cxnSp>
-      <p:cxnSp>
-        <p:nvCxnSpPr>
-          <p:cNvPr id="81" name="Connecteur droit avec flèche 80">
-            <a:extLst>
-              <a:ext uri="{FF2B5EF4-FFF2-40B4-BE49-F238E27FC236}">
-                <a16:creationId xmlns:a16="http://schemas.microsoft.com/office/drawing/2014/main" id="{1BB1BBB7-ADC8-4C85-9800-D4B2EC118E01}"/>
-              </a:ext>
-            </a:extLst>
-          </p:cNvPr>
-          <p:cNvCxnSpPr>
-            <a:cxnSpLocks/>
-            <a:endCxn id="63" idx="1"/>
-          </p:cNvCxnSpPr>
-          <p:nvPr/>
-        </p:nvCxnSpPr>
-        <p:spPr>
-          <a:xfrm flipV="1">
-            <a:off x="9813972" y="2886013"/>
-            <a:ext cx="522543" cy="4528"/>
-          </a:xfrm>
-          <a:prstGeom prst="straightConnector1">
-            <a:avLst/>
-          </a:prstGeom>
-          <a:ln>
-            <a:solidFill>
-              <a:srgbClr val="FF0000"/>
-            </a:solidFill>
-            <a:tailEnd type="triangle"/>
-          </a:ln>
-        </p:spPr>
-        <p:style>
-          <a:lnRef idx="1">
-            <a:schemeClr val="accent1"/>
-          </a:lnRef>
-          <a:fillRef idx="0">
-            <a:schemeClr val="accent1"/>
-          </a:fillRef>
-          <a:effectRef idx="0">
-            <a:schemeClr val="accent1"/>
-          </a:effectRef>
-          <a:fontRef idx="minor">
-            <a:schemeClr val="tx1"/>
-          </a:fontRef>
-        </p:style>
-      </p:cxnSp>
-      <p:cxnSp>
-        <p:nvCxnSpPr>
-          <p:cNvPr id="83" name="Connecteur droit avec flèche 82">
-            <a:extLst>
-              <a:ext uri="{FF2B5EF4-FFF2-40B4-BE49-F238E27FC236}">
-                <a16:creationId xmlns:a16="http://schemas.microsoft.com/office/drawing/2014/main" id="{4B1FC35A-659D-4D2F-A80A-79CEC6008BE5}"/>
-              </a:ext>
-            </a:extLst>
-          </p:cNvPr>
-          <p:cNvCxnSpPr>
-            <a:cxnSpLocks/>
-            <a:endCxn id="28" idx="1"/>
-          </p:cNvCxnSpPr>
-          <p:nvPr/>
-        </p:nvCxnSpPr>
-        <p:spPr>
-          <a:xfrm>
-            <a:off x="9361447" y="3354375"/>
-            <a:ext cx="971053" cy="1304556"/>
-          </a:xfrm>
-          <a:prstGeom prst="straightConnector1">
-            <a:avLst/>
-          </a:prstGeom>
-          <a:ln>
-            <a:solidFill>
-              <a:srgbClr val="FF0000"/>
-            </a:solidFill>
-            <a:tailEnd type="triangle"/>
-          </a:ln>
-        </p:spPr>
-        <p:style>
-          <a:lnRef idx="1">
-            <a:schemeClr val="accent1"/>
-          </a:lnRef>
-          <a:fillRef idx="0">
-            <a:schemeClr val="accent1"/>
-          </a:fillRef>
-          <a:effectRef idx="0">
-            <a:schemeClr val="accent1"/>
-          </a:effectRef>
-          <a:fontRef idx="minor">
-            <a:schemeClr val="tx1"/>
-          </a:fontRef>
-        </p:style>
-      </p:cxnSp>
-      <p:sp>
-        <p:nvSpPr>
-          <p:cNvPr id="85" name="Rectangle 84">
-            <a:extLst>
-              <a:ext uri="{FF2B5EF4-FFF2-40B4-BE49-F238E27FC236}">
-                <a16:creationId xmlns:a16="http://schemas.microsoft.com/office/drawing/2014/main" id="{9F8CD7CC-A396-4C32-9A9E-D9DF4E873528}"/>
-              </a:ext>
-            </a:extLst>
-          </p:cNvPr>
-          <p:cNvSpPr/>
-          <p:nvPr/>
-        </p:nvSpPr>
-        <p:spPr>
-          <a:xfrm>
-            <a:off x="9052672" y="3788183"/>
-            <a:ext cx="2195216" cy="369332"/>
-          </a:xfrm>
-          <a:prstGeom prst="rect">
-            <a:avLst/>
-          </a:prstGeom>
-        </p:spPr>
-        <p:txBody>
-          <a:bodyPr wrap="none">
-            <a:spAutoFit/>
-          </a:bodyPr>
-          <a:lstStyle/>
-          <a:p>
-            <a:r>
-              <a:rPr lang="en-US" dirty="0" err="1">
-                <a:solidFill>
-                  <a:srgbClr val="FF0000"/>
-                </a:solidFill>
-              </a:rPr>
-              <a:t>CSI_FingerID_writer</a:t>
-            </a:r>
-            <a:r>
-              <a:rPr lang="en-US" dirty="0">
-                <a:solidFill>
-                  <a:srgbClr val="FF0000"/>
-                </a:solidFill>
-              </a:rPr>
-              <a:t>()</a:t>
-            </a:r>
-          </a:p>
-        </p:txBody>
-      </p:sp>
-      <p:sp>
-        <p:nvSpPr>
-          <p:cNvPr id="86" name="Rectangle 85">
-            <a:extLst>
-              <a:ext uri="{FF2B5EF4-FFF2-40B4-BE49-F238E27FC236}">
-                <a16:creationId xmlns:a16="http://schemas.microsoft.com/office/drawing/2014/main" id="{53AF86CF-5DFA-4E6C-BDDF-4A206A430FBA}"/>
-              </a:ext>
-            </a:extLst>
-          </p:cNvPr>
-          <p:cNvSpPr/>
-          <p:nvPr/>
-        </p:nvSpPr>
-        <p:spPr>
-          <a:xfrm>
-            <a:off x="9447175" y="2168513"/>
-            <a:ext cx="1910203" cy="369332"/>
-          </a:xfrm>
-          <a:prstGeom prst="rect">
-            <a:avLst/>
-          </a:prstGeom>
-        </p:spPr>
-        <p:txBody>
-          <a:bodyPr wrap="none">
-            <a:spAutoFit/>
-          </a:bodyPr>
-          <a:lstStyle/>
-          <a:p>
-            <a:r>
-              <a:rPr lang="en-US" dirty="0" err="1">
-                <a:solidFill>
-                  <a:srgbClr val="FF0000"/>
-                </a:solidFill>
-              </a:rPr>
-              <a:t>MSFinder_writer</a:t>
-            </a:r>
-            <a:r>
-              <a:rPr lang="en-US" dirty="0">
-                <a:solidFill>
-                  <a:srgbClr val="FF0000"/>
-                </a:solidFill>
-              </a:rPr>
-              <a:t>()</a:t>
-            </a:r>
-          </a:p>
-        </p:txBody>
-      </p:sp>
-      <p:sp>
-        <p:nvSpPr>
-          <p:cNvPr id="87" name="Flèche : bas 86">
-            <a:extLst>
-              <a:ext uri="{FF2B5EF4-FFF2-40B4-BE49-F238E27FC236}">
-                <a16:creationId xmlns:a16="http://schemas.microsoft.com/office/drawing/2014/main" id="{BFBEE889-8CB0-4416-8C99-E56CFFBCAB82}"/>
-              </a:ext>
-            </a:extLst>
-          </p:cNvPr>
-          <p:cNvSpPr/>
-          <p:nvPr/>
-        </p:nvSpPr>
-        <p:spPr>
-          <a:xfrm rot="16200000">
-            <a:off x="9484571" y="5974332"/>
-            <a:ext cx="380758" cy="476994"/>
-          </a:xfrm>
-          <a:prstGeom prst="downArrow">
-            <a:avLst/>
-          </a:prstGeom>
-        </p:spPr>
-        <p:style>
-          <a:lnRef idx="2">
-            <a:schemeClr val="accent1">
-              <a:shade val="50000"/>
-            </a:schemeClr>
-          </a:lnRef>
-          <a:fillRef idx="1">
-            <a:schemeClr val="accent1"/>
-          </a:fillRef>
-          <a:effectRef idx="0">
-            <a:schemeClr val="accent1"/>
-          </a:effectRef>
-          <a:fontRef idx="minor">
-            <a:schemeClr val="lt1"/>
-          </a:fontRef>
-        </p:style>
-        <p:txBody>
-          <a:bodyPr rtlCol="0" anchor="ctr"/>
-          <a:lstStyle/>
-          <a:p>
-            <a:pPr algn="ctr"/>
-            <a:endParaRPr lang="en-US"/>
-          </a:p>
-        </p:txBody>
-      </p:sp>
-      <p:sp>
-        <p:nvSpPr>
-          <p:cNvPr id="44" name="Rectangle 43">
-            <a:extLst>
-              <a:ext uri="{FF2B5EF4-FFF2-40B4-BE49-F238E27FC236}">
-                <a16:creationId xmlns:a16="http://schemas.microsoft.com/office/drawing/2014/main" id="{765DDFE1-8F93-4C3D-8D2D-4C7F8B15EA75}"/>
-              </a:ext>
-            </a:extLst>
-          </p:cNvPr>
-          <p:cNvSpPr/>
-          <p:nvPr/>
-        </p:nvSpPr>
-        <p:spPr>
-          <a:xfrm>
-            <a:off x="3490380" y="3680436"/>
-            <a:ext cx="1443793" cy="400110"/>
-          </a:xfrm>
-          <a:prstGeom prst="rect">
-            <a:avLst/>
-          </a:prstGeom>
-        </p:spPr>
-        <p:txBody>
-          <a:bodyPr wrap="none">
-            <a:spAutoFit/>
-          </a:bodyPr>
-          <a:lstStyle/>
-          <a:p>
-            <a:r>
-              <a:rPr lang="en-US" sz="2000" i="1" dirty="0"/>
-              <a:t>Extract MS2</a:t>
-            </a:r>
-          </a:p>
-        </p:txBody>
-      </p:sp>
-      <p:sp>
-        <p:nvSpPr>
-          <p:cNvPr id="20" name="Rectangle 19">
-            <a:extLst>
-              <a:ext uri="{FF2B5EF4-FFF2-40B4-BE49-F238E27FC236}">
-                <a16:creationId xmlns:a16="http://schemas.microsoft.com/office/drawing/2014/main" id="{B9AF68C0-A521-4599-9FE0-4F7090D80718}"/>
-              </a:ext>
-            </a:extLst>
-          </p:cNvPr>
-          <p:cNvSpPr/>
-          <p:nvPr/>
-        </p:nvSpPr>
-        <p:spPr>
-          <a:xfrm>
-            <a:off x="3490380" y="1698063"/>
-            <a:ext cx="1443793" cy="400110"/>
-          </a:xfrm>
-          <a:prstGeom prst="rect">
-            <a:avLst/>
-          </a:prstGeom>
-        </p:spPr>
-        <p:txBody>
-          <a:bodyPr wrap="none">
-            <a:spAutoFit/>
-          </a:bodyPr>
-          <a:lstStyle/>
-          <a:p>
-            <a:r>
-              <a:rPr lang="en-US" sz="2000" i="1" dirty="0"/>
-              <a:t>Extract MS1</a:t>
-            </a:r>
-          </a:p>
-        </p:txBody>
-      </p:sp>
-      <p:sp>
-        <p:nvSpPr>
-          <p:cNvPr id="45" name="ZoneTexte 44">
-            <a:extLst>
-              <a:ext uri="{FF2B5EF4-FFF2-40B4-BE49-F238E27FC236}">
-                <a16:creationId xmlns:a16="http://schemas.microsoft.com/office/drawing/2014/main" id="{18AAE3A4-5412-42E1-840A-CD53447501B5}"/>
-              </a:ext>
-            </a:extLst>
-          </p:cNvPr>
-          <p:cNvSpPr txBox="1"/>
-          <p:nvPr/>
-        </p:nvSpPr>
-        <p:spPr>
-          <a:xfrm>
-            <a:off x="6276760" y="461054"/>
-            <a:ext cx="2103153" cy="400110"/>
-          </a:xfrm>
-          <a:prstGeom prst="rect">
-            <a:avLst/>
-          </a:prstGeom>
-          <a:noFill/>
-        </p:spPr>
-        <p:txBody>
-          <a:bodyPr wrap="square" rtlCol="0">
-            <a:spAutoFit/>
-          </a:bodyPr>
-          <a:lstStyle/>
-          <a:p>
-            <a:pPr algn="ctr"/>
-            <a:r>
-              <a:rPr lang="en-US" sz="2000" i="1" dirty="0" err="1">
-                <a:solidFill>
-                  <a:srgbClr val="FF0000"/>
-                </a:solidFill>
-              </a:rPr>
-              <a:t>process_library</a:t>
-            </a:r>
-            <a:r>
-              <a:rPr lang="en-US" sz="2000" i="1" dirty="0">
-                <a:solidFill>
-                  <a:srgbClr val="FF0000"/>
-                </a:solidFill>
-              </a:rPr>
-              <a:t>()</a:t>
-            </a:r>
-          </a:p>
-        </p:txBody>
-      </p:sp>
-      <p:sp>
-        <p:nvSpPr>
-          <p:cNvPr id="46" name="Flèche : bas 45">
-            <a:extLst>
-              <a:ext uri="{FF2B5EF4-FFF2-40B4-BE49-F238E27FC236}">
-                <a16:creationId xmlns:a16="http://schemas.microsoft.com/office/drawing/2014/main" id="{237D30B9-AFB0-4599-80B3-3C0A20800A6F}"/>
-              </a:ext>
-            </a:extLst>
-          </p:cNvPr>
-          <p:cNvSpPr/>
-          <p:nvPr/>
-        </p:nvSpPr>
-        <p:spPr>
-          <a:xfrm rot="14245797">
-            <a:off x="4008361" y="5066395"/>
-            <a:ext cx="380758" cy="476994"/>
-          </a:xfrm>
-          <a:prstGeom prst="downArrow">
-            <a:avLst/>
-          </a:prstGeom>
-        </p:spPr>
-        <p:style>
-          <a:lnRef idx="2">
-            <a:schemeClr val="accent1">
-              <a:shade val="50000"/>
-            </a:schemeClr>
-          </a:lnRef>
-          <a:fillRef idx="1">
-            <a:schemeClr val="accent1"/>
-          </a:fillRef>
-          <a:effectRef idx="0">
-            <a:schemeClr val="accent1"/>
-          </a:effectRef>
-          <a:fontRef idx="minor">
-            <a:schemeClr val="lt1"/>
-          </a:fontRef>
-        </p:style>
-        <p:txBody>
-          <a:bodyPr rtlCol="0" anchor="ctr"/>
-          <a:lstStyle/>
-          <a:p>
-            <a:pPr algn="ctr"/>
-            <a:endParaRPr lang="en-US"/>
-          </a:p>
-        </p:txBody>
-      </p:sp>
     </p:spTree>
     <p:extLst>
       <p:ext uri="{BB962C8B-B14F-4D97-AF65-F5344CB8AC3E}">
@@ -6761,8 +6400,8 @@
         </p:nvSpPr>
         <p:spPr>
           <a:xfrm>
-            <a:off x="-668475" y="-301574"/>
-            <a:ext cx="3318147" cy="923330"/>
+            <a:off x="-787455" y="-729813"/>
+            <a:ext cx="3318147" cy="1477328"/>
           </a:xfrm>
           <a:prstGeom prst="rect">
             <a:avLst/>
@@ -6776,7 +6415,7 @@
           <a:p>
             <a:r>
               <a:rPr lang="en-US" dirty="0"/>
-              <a:t>Retention time (in minute) of metabolic features to be found, please put it to N/A if unknown</a:t>
+              <a:t>Retention time (in minute) of metabolic features to be found, please put it to N/A if unknown. Important if isomers are present in the same sample.</a:t>
             </a:r>
           </a:p>
         </p:txBody>
@@ -6797,8 +6436,8 @@
         </p:nvCxnSpPr>
         <p:spPr>
           <a:xfrm flipH="1" flipV="1">
-            <a:off x="1433384" y="571429"/>
-            <a:ext cx="1062037" cy="515946"/>
+            <a:off x="2029788" y="633051"/>
+            <a:ext cx="465635" cy="454324"/>
           </a:xfrm>
           <a:prstGeom prst="straightConnector1">
             <a:avLst/>
@@ -8993,6 +8632,149 @@
     <p:extLst>
       <p:ext uri="{BB962C8B-B14F-4D97-AF65-F5344CB8AC3E}">
         <p14:creationId xmlns:p14="http://schemas.microsoft.com/office/powerpoint/2010/main" val="444585465"/>
+      </p:ext>
+    </p:extLst>
+  </p:cSld>
+  <p:clrMapOvr>
+    <a:masterClrMapping/>
+  </p:clrMapOvr>
+</p:sld>
+</file>
+
+<file path=ppt/slides/slide8.xml><?xml version="1.0" encoding="utf-8"?>
+<p:sld xmlns:a="http://schemas.openxmlformats.org/drawingml/2006/main" xmlns:r="http://schemas.openxmlformats.org/officeDocument/2006/relationships" xmlns:p="http://schemas.openxmlformats.org/presentationml/2006/main">
+  <p:cSld>
+    <p:spTree>
+      <p:nvGrpSpPr>
+        <p:cNvPr id="1" name=""/>
+        <p:cNvGrpSpPr/>
+        <p:nvPr/>
+      </p:nvGrpSpPr>
+      <p:grpSpPr>
+        <a:xfrm>
+          <a:off x="0" y="0"/>
+          <a:ext cx="0" cy="0"/>
+          <a:chOff x="0" y="0"/>
+          <a:chExt cx="0" cy="0"/>
+        </a:xfrm>
+      </p:grpSpPr>
+      <p:pic>
+        <p:nvPicPr>
+          <p:cNvPr id="4" name="Image 3">
+            <a:extLst>
+              <a:ext uri="{FF2B5EF4-FFF2-40B4-BE49-F238E27FC236}">
+                <a16:creationId xmlns:a16="http://schemas.microsoft.com/office/drawing/2014/main" id="{7948D92B-6A99-487D-A9B8-3A137E3283B8}"/>
+              </a:ext>
+            </a:extLst>
+          </p:cNvPr>
+          <p:cNvPicPr>
+            <a:picLocks noChangeAspect="1"/>
+          </p:cNvPicPr>
+          <p:nvPr/>
+        </p:nvPicPr>
+        <p:blipFill>
+          <a:blip r:embed="rId2"/>
+          <a:stretch>
+            <a:fillRect/>
+          </a:stretch>
+        </p:blipFill>
+        <p:spPr>
+          <a:xfrm>
+            <a:off x="1875349" y="850496"/>
+            <a:ext cx="4839119" cy="3993226"/>
+          </a:xfrm>
+          <a:prstGeom prst="rect">
+            <a:avLst/>
+          </a:prstGeom>
+        </p:spPr>
+      </p:pic>
+      <p:cxnSp>
+        <p:nvCxnSpPr>
+          <p:cNvPr id="6" name="Connecteur droit avec flèche 5">
+            <a:extLst>
+              <a:ext uri="{FF2B5EF4-FFF2-40B4-BE49-F238E27FC236}">
+                <a16:creationId xmlns:a16="http://schemas.microsoft.com/office/drawing/2014/main" id="{5C4EBA06-2290-4667-B749-2CCAAAE1225A}"/>
+              </a:ext>
+            </a:extLst>
+          </p:cNvPr>
+          <p:cNvCxnSpPr>
+            <a:cxnSpLocks/>
+          </p:cNvCxnSpPr>
+          <p:nvPr/>
+        </p:nvCxnSpPr>
+        <p:spPr>
+          <a:xfrm flipH="1" flipV="1">
+            <a:off x="5430979" y="2253673"/>
+            <a:ext cx="480292" cy="380999"/>
+          </a:xfrm>
+          <a:prstGeom prst="straightConnector1">
+            <a:avLst/>
+          </a:prstGeom>
+          <a:ln>
+            <a:solidFill>
+              <a:srgbClr val="0000FF"/>
+            </a:solidFill>
+            <a:tailEnd type="triangle"/>
+          </a:ln>
+        </p:spPr>
+        <p:style>
+          <a:lnRef idx="1">
+            <a:schemeClr val="accent1"/>
+          </a:lnRef>
+          <a:fillRef idx="0">
+            <a:schemeClr val="accent1"/>
+          </a:fillRef>
+          <a:effectRef idx="0">
+            <a:schemeClr val="accent1"/>
+          </a:effectRef>
+          <a:fontRef idx="minor">
+            <a:schemeClr val="tx1"/>
+          </a:fontRef>
+        </p:style>
+      </p:cxnSp>
+      <p:sp>
+        <p:nvSpPr>
+          <p:cNvPr id="7" name="ZoneTexte 6">
+            <a:extLst>
+              <a:ext uri="{FF2B5EF4-FFF2-40B4-BE49-F238E27FC236}">
+                <a16:creationId xmlns:a16="http://schemas.microsoft.com/office/drawing/2014/main" id="{B3BF6AD5-AE32-42A8-8E8A-F1596D31EDBF}"/>
+              </a:ext>
+            </a:extLst>
+          </p:cNvPr>
+          <p:cNvSpPr txBox="1"/>
+          <p:nvPr/>
+        </p:nvSpPr>
+        <p:spPr>
+          <a:xfrm>
+            <a:off x="4063999" y="1468554"/>
+            <a:ext cx="1801091" cy="1077218"/>
+          </a:xfrm>
+          <a:prstGeom prst="rect">
+            <a:avLst/>
+          </a:prstGeom>
+          <a:noFill/>
+        </p:spPr>
+        <p:txBody>
+          <a:bodyPr wrap="square" rtlCol="0">
+            <a:spAutoFit/>
+          </a:bodyPr>
+          <a:lstStyle/>
+          <a:p>
+            <a:r>
+              <a:rPr lang="en-US" sz="1600" dirty="0">
+                <a:solidFill>
+                  <a:srgbClr val="0000FF"/>
+                </a:solidFill>
+              </a:rPr>
+              <a:t>Blue points: m/z and intensity of matched query fragments </a:t>
+            </a:r>
+          </a:p>
+        </p:txBody>
+      </p:sp>
+    </p:spTree>
+    <p:extLst>
+      <p:ext uri="{BB962C8B-B14F-4D97-AF65-F5344CB8AC3E}">
+        <p14:creationId xmlns:p14="http://schemas.microsoft.com/office/powerpoint/2010/main" val="2483153400"/>
       </p:ext>
     </p:extLst>
   </p:cSld>

</xml_diff>